<commit_message>
More fun with Lua!
</commit_message>
<xml_diff>
--- a/6044_FramPat/D2D/W09+/W11_Timing_and_animations.pptx
+++ b/6044_FramPat/D2D/W09+/W11_Timing_and_animations.pptx
@@ -24,6 +24,13 @@
     <p:sldId id="272" r:id="rId18"/>
     <p:sldId id="273" r:id="rId19"/>
     <p:sldId id="275" r:id="rId20"/>
+    <p:sldId id="276" r:id="rId21"/>
+    <p:sldId id="277" r:id="rId22"/>
+    <p:sldId id="278" r:id="rId23"/>
+    <p:sldId id="279" r:id="rId24"/>
+    <p:sldId id="280" r:id="rId25"/>
+    <p:sldId id="281" r:id="rId26"/>
+    <p:sldId id="282" r:id="rId27"/>
   </p:sldIdLst>
   <p:sldSz cx="12192000" cy="6858000"/>
   <p:notesSz cx="6858000" cy="9144000"/>
@@ -279,7 +286,7 @@
           <a:p>
             <a:fld id="{9D2A0A23-9773-4913-8748-7450C927C5BF}" type="datetimeFigureOut">
               <a:rPr lang="en-CA" smtClean="0"/>
-              <a:t>2023-11-28</a:t>
+              <a:t>2024-11-25</a:t>
             </a:fld>
             <a:endParaRPr lang="en-CA"/>
           </a:p>
@@ -479,7 +486,7 @@
           <a:p>
             <a:fld id="{9D2A0A23-9773-4913-8748-7450C927C5BF}" type="datetimeFigureOut">
               <a:rPr lang="en-CA" smtClean="0"/>
-              <a:t>2023-11-28</a:t>
+              <a:t>2024-11-25</a:t>
             </a:fld>
             <a:endParaRPr lang="en-CA"/>
           </a:p>
@@ -689,7 +696,7 @@
           <a:p>
             <a:fld id="{9D2A0A23-9773-4913-8748-7450C927C5BF}" type="datetimeFigureOut">
               <a:rPr lang="en-CA" smtClean="0"/>
-              <a:t>2023-11-28</a:t>
+              <a:t>2024-11-25</a:t>
             </a:fld>
             <a:endParaRPr lang="en-CA"/>
           </a:p>
@@ -889,7 +896,7 @@
           <a:p>
             <a:fld id="{9D2A0A23-9773-4913-8748-7450C927C5BF}" type="datetimeFigureOut">
               <a:rPr lang="en-CA" smtClean="0"/>
-              <a:t>2023-11-28</a:t>
+              <a:t>2024-11-25</a:t>
             </a:fld>
             <a:endParaRPr lang="en-CA"/>
           </a:p>
@@ -1165,7 +1172,7 @@
           <a:p>
             <a:fld id="{9D2A0A23-9773-4913-8748-7450C927C5BF}" type="datetimeFigureOut">
               <a:rPr lang="en-CA" smtClean="0"/>
-              <a:t>2023-11-28</a:t>
+              <a:t>2024-11-25</a:t>
             </a:fld>
             <a:endParaRPr lang="en-CA"/>
           </a:p>
@@ -1433,7 +1440,7 @@
           <a:p>
             <a:fld id="{9D2A0A23-9773-4913-8748-7450C927C5BF}" type="datetimeFigureOut">
               <a:rPr lang="en-CA" smtClean="0"/>
-              <a:t>2023-11-28</a:t>
+              <a:t>2024-11-25</a:t>
             </a:fld>
             <a:endParaRPr lang="en-CA"/>
           </a:p>
@@ -1848,7 +1855,7 @@
           <a:p>
             <a:fld id="{9D2A0A23-9773-4913-8748-7450C927C5BF}" type="datetimeFigureOut">
               <a:rPr lang="en-CA" smtClean="0"/>
-              <a:t>2023-11-28</a:t>
+              <a:t>2024-11-25</a:t>
             </a:fld>
             <a:endParaRPr lang="en-CA"/>
           </a:p>
@@ -1990,7 +1997,7 @@
           <a:p>
             <a:fld id="{9D2A0A23-9773-4913-8748-7450C927C5BF}" type="datetimeFigureOut">
               <a:rPr lang="en-CA" smtClean="0"/>
-              <a:t>2023-11-28</a:t>
+              <a:t>2024-11-25</a:t>
             </a:fld>
             <a:endParaRPr lang="en-CA"/>
           </a:p>
@@ -2103,7 +2110,7 @@
           <a:p>
             <a:fld id="{9D2A0A23-9773-4913-8748-7450C927C5BF}" type="datetimeFigureOut">
               <a:rPr lang="en-CA" smtClean="0"/>
-              <a:t>2023-11-28</a:t>
+              <a:t>2024-11-25</a:t>
             </a:fld>
             <a:endParaRPr lang="en-CA"/>
           </a:p>
@@ -2416,7 +2423,7 @@
           <a:p>
             <a:fld id="{9D2A0A23-9773-4913-8748-7450C927C5BF}" type="datetimeFigureOut">
               <a:rPr lang="en-CA" smtClean="0"/>
-              <a:t>2023-11-28</a:t>
+              <a:t>2024-11-25</a:t>
             </a:fld>
             <a:endParaRPr lang="en-CA"/>
           </a:p>
@@ -2705,7 +2712,7 @@
           <a:p>
             <a:fld id="{9D2A0A23-9773-4913-8748-7450C927C5BF}" type="datetimeFigureOut">
               <a:rPr lang="en-CA" smtClean="0"/>
-              <a:t>2023-11-28</a:t>
+              <a:t>2024-11-25</a:t>
             </a:fld>
             <a:endParaRPr lang="en-CA"/>
           </a:p>
@@ -2948,7 +2955,7 @@
           <a:p>
             <a:fld id="{9D2A0A23-9773-4913-8748-7450C927C5BF}" type="datetimeFigureOut">
               <a:rPr lang="en-CA" smtClean="0"/>
-              <a:t>2023-11-28</a:t>
+              <a:t>2024-11-25</a:t>
             </a:fld>
             <a:endParaRPr lang="en-CA"/>
           </a:p>
@@ -5279,6 +5286,2548 @@
 </p:sld>
 </file>
 
+<file path=ppt/slides/slide20.xml><?xml version="1.0" encoding="utf-8"?>
+<p:sld xmlns:a="http://schemas.openxmlformats.org/drawingml/2006/main" xmlns:r="http://schemas.openxmlformats.org/officeDocument/2006/relationships" xmlns:p="http://schemas.openxmlformats.org/presentationml/2006/main">
+  <p:cSld>
+    <p:spTree>
+      <p:nvGrpSpPr>
+        <p:cNvPr id="1" name=""/>
+        <p:cNvGrpSpPr/>
+        <p:nvPr/>
+      </p:nvGrpSpPr>
+      <p:grpSpPr>
+        <a:xfrm>
+          <a:off x="0" y="0"/>
+          <a:ext cx="0" cy="0"/>
+          <a:chOff x="0" y="0"/>
+          <a:chExt cx="0" cy="0"/>
+        </a:xfrm>
+      </p:grpSpPr>
+      <p:sp>
+        <p:nvSpPr>
+          <p:cNvPr id="4" name="Title 3">
+            <a:extLst>
+              <a:ext uri="{FF2B5EF4-FFF2-40B4-BE49-F238E27FC236}">
+                <a16:creationId xmlns:a16="http://schemas.microsoft.com/office/drawing/2014/main" id="{157D5BCF-B081-CBF4-60F5-0AF56AC3D328}"/>
+              </a:ext>
+            </a:extLst>
+          </p:cNvPr>
+          <p:cNvSpPr>
+            <a:spLocks noGrp="1"/>
+          </p:cNvSpPr>
+          <p:nvPr>
+            <p:ph type="ctrTitle"/>
+          </p:nvPr>
+        </p:nvSpPr>
+        <p:spPr/>
+        <p:txBody>
+          <a:bodyPr/>
+          <a:lstStyle/>
+          <a:p>
+            <a:r>
+              <a:rPr lang="en-CA" dirty="0"/>
+              <a:t>Commands: Serial &amp; Parallel</a:t>
+            </a:r>
+          </a:p>
+        </p:txBody>
+      </p:sp>
+      <p:sp>
+        <p:nvSpPr>
+          <p:cNvPr id="5" name="Subtitle 4">
+            <a:extLst>
+              <a:ext uri="{FF2B5EF4-FFF2-40B4-BE49-F238E27FC236}">
+                <a16:creationId xmlns:a16="http://schemas.microsoft.com/office/drawing/2014/main" id="{026A475F-8F51-1C0C-583B-7B3A034512BD}"/>
+              </a:ext>
+            </a:extLst>
+          </p:cNvPr>
+          <p:cNvSpPr>
+            <a:spLocks noGrp="1"/>
+          </p:cNvSpPr>
+          <p:nvPr>
+            <p:ph type="subTitle" idx="1"/>
+          </p:nvPr>
+        </p:nvSpPr>
+        <p:spPr/>
+        <p:txBody>
+          <a:bodyPr/>
+          <a:lstStyle/>
+          <a:p>
+            <a:r>
+              <a:rPr lang="en-CA" dirty="0"/>
+              <a:t>(Using the FIRST Robotics style design)</a:t>
+            </a:r>
+          </a:p>
+        </p:txBody>
+      </p:sp>
+    </p:spTree>
+    <p:extLst>
+      <p:ext uri="{BB962C8B-B14F-4D97-AF65-F5344CB8AC3E}">
+        <p14:creationId xmlns:p14="http://schemas.microsoft.com/office/powerpoint/2010/main" val="3273112047"/>
+      </p:ext>
+    </p:extLst>
+  </p:cSld>
+  <p:clrMapOvr>
+    <a:masterClrMapping/>
+  </p:clrMapOvr>
+</p:sld>
+</file>
+
+<file path=ppt/slides/slide21.xml><?xml version="1.0" encoding="utf-8"?>
+<p:sld xmlns:a="http://schemas.openxmlformats.org/drawingml/2006/main" xmlns:r="http://schemas.openxmlformats.org/officeDocument/2006/relationships" xmlns:p="http://schemas.openxmlformats.org/presentationml/2006/main">
+  <p:cSld>
+    <p:spTree>
+      <p:nvGrpSpPr>
+        <p:cNvPr id="1" name=""/>
+        <p:cNvGrpSpPr/>
+        <p:nvPr/>
+      </p:nvGrpSpPr>
+      <p:grpSpPr>
+        <a:xfrm>
+          <a:off x="0" y="0"/>
+          <a:ext cx="0" cy="0"/>
+          <a:chOff x="0" y="0"/>
+          <a:chExt cx="0" cy="0"/>
+        </a:xfrm>
+      </p:grpSpPr>
+      <p:sp>
+        <p:nvSpPr>
+          <p:cNvPr id="2" name="Title 1">
+            <a:extLst>
+              <a:ext uri="{FF2B5EF4-FFF2-40B4-BE49-F238E27FC236}">
+                <a16:creationId xmlns:a16="http://schemas.microsoft.com/office/drawing/2014/main" id="{589EEBFB-9A99-AA04-9D9C-7E44DD2BD13D}"/>
+              </a:ext>
+            </a:extLst>
+          </p:cNvPr>
+          <p:cNvSpPr>
+            <a:spLocks noGrp="1"/>
+          </p:cNvSpPr>
+          <p:nvPr>
+            <p:ph type="title"/>
+          </p:nvPr>
+        </p:nvSpPr>
+        <p:spPr/>
+        <p:txBody>
+          <a:bodyPr/>
+          <a:lstStyle/>
+          <a:p>
+            <a:r>
+              <a:rPr lang="en-CA" dirty="0"/>
+              <a:t>A “command”</a:t>
+            </a:r>
+          </a:p>
+        </p:txBody>
+      </p:sp>
+      <p:sp>
+        <p:nvSpPr>
+          <p:cNvPr id="3" name="Content Placeholder 2">
+            <a:extLst>
+              <a:ext uri="{FF2B5EF4-FFF2-40B4-BE49-F238E27FC236}">
+                <a16:creationId xmlns:a16="http://schemas.microsoft.com/office/drawing/2014/main" id="{E63D159C-4821-CC59-5719-7CA99EA5BCC2}"/>
+              </a:ext>
+            </a:extLst>
+          </p:cNvPr>
+          <p:cNvSpPr>
+            <a:spLocks noGrp="1"/>
+          </p:cNvSpPr>
+          <p:nvPr>
+            <p:ph idx="1"/>
+          </p:nvPr>
+        </p:nvSpPr>
+        <p:spPr>
+          <a:xfrm>
+            <a:off x="838200" y="1825625"/>
+            <a:ext cx="10515600" cy="2746375"/>
+          </a:xfrm>
+        </p:spPr>
+        <p:txBody>
+          <a:bodyPr/>
+          <a:lstStyle/>
+          <a:p>
+            <a:r>
+              <a:rPr lang="en-CA" dirty="0"/>
+              <a:t>Add some “command” (like </a:t>
+            </a:r>
+            <a:r>
+              <a:rPr lang="en-CA" dirty="0" err="1"/>
+              <a:t>MoveTo</a:t>
+            </a:r>
+            <a:r>
+              <a:rPr lang="en-CA" dirty="0"/>
+              <a:t>) to the object itself</a:t>
+            </a:r>
+          </a:p>
+          <a:p>
+            <a:pPr lvl="1"/>
+            <a:r>
+              <a:rPr lang="en-CA" dirty="0" err="1"/>
+              <a:t>cMesh</a:t>
+            </a:r>
+            <a:r>
+              <a:rPr lang="en-CA" dirty="0"/>
+              <a:t>::</a:t>
+            </a:r>
+            <a:r>
+              <a:rPr lang="en-CA" dirty="0" err="1"/>
+              <a:t>MoveTo</a:t>
+            </a:r>
+            <a:r>
+              <a:rPr lang="en-CA" dirty="0"/>
+              <a:t>(vec3 destination, float speed)</a:t>
+            </a:r>
+          </a:p>
+          <a:p>
+            <a:pPr lvl="1"/>
+            <a:r>
+              <a:rPr lang="en-CA" dirty="0" err="1"/>
+              <a:t>cSpaceShip</a:t>
+            </a:r>
+            <a:r>
+              <a:rPr lang="en-CA" dirty="0"/>
+              <a:t>::</a:t>
+            </a:r>
+            <a:r>
+              <a:rPr lang="en-CA" dirty="0" err="1"/>
+              <a:t>MoveTo</a:t>
+            </a:r>
+            <a:r>
+              <a:rPr lang="en-CA" dirty="0"/>
+              <a:t>()…</a:t>
+            </a:r>
+          </a:p>
+          <a:p>
+            <a:r>
+              <a:rPr lang="en-CA" dirty="0"/>
+              <a:t>Instead, we are going to split this into two parts:</a:t>
+            </a:r>
+          </a:p>
+          <a:p>
+            <a:pPr lvl="1"/>
+            <a:r>
+              <a:rPr lang="en-CA" dirty="0"/>
+              <a:t>The thing we are moving (in our example, this is an </a:t>
+            </a:r>
+            <a:r>
+              <a:rPr lang="en-CA" dirty="0" err="1"/>
+              <a:t>sMesh</a:t>
+            </a:r>
+            <a:r>
+              <a:rPr lang="en-CA" dirty="0"/>
+              <a:t> object)</a:t>
+            </a:r>
+          </a:p>
+          <a:p>
+            <a:pPr lvl="1"/>
+            <a:r>
+              <a:rPr lang="en-CA" dirty="0"/>
+              <a:t>The command we are running, which “connects” somehow to the object</a:t>
+            </a:r>
+          </a:p>
+        </p:txBody>
+      </p:sp>
+      <p:sp>
+        <p:nvSpPr>
+          <p:cNvPr id="4" name="Rectangle: Rounded Corners 3">
+            <a:extLst>
+              <a:ext uri="{FF2B5EF4-FFF2-40B4-BE49-F238E27FC236}">
+                <a16:creationId xmlns:a16="http://schemas.microsoft.com/office/drawing/2014/main" id="{904A5FDF-D85A-7FA9-2F2B-608AD94F3200}"/>
+              </a:ext>
+            </a:extLst>
+          </p:cNvPr>
+          <p:cNvSpPr/>
+          <p:nvPr/>
+        </p:nvSpPr>
+        <p:spPr>
+          <a:xfrm>
+            <a:off x="373625" y="4572000"/>
+            <a:ext cx="2094271" cy="1612490"/>
+          </a:xfrm>
+          <a:prstGeom prst="roundRect">
+            <a:avLst/>
+          </a:prstGeom>
+        </p:spPr>
+        <p:style>
+          <a:lnRef idx="2">
+            <a:schemeClr val="accent1">
+              <a:shade val="15000"/>
+            </a:schemeClr>
+          </a:lnRef>
+          <a:fillRef idx="1">
+            <a:schemeClr val="accent1"/>
+          </a:fillRef>
+          <a:effectRef idx="0">
+            <a:schemeClr val="accent1"/>
+          </a:effectRef>
+          <a:fontRef idx="minor">
+            <a:schemeClr val="lt1"/>
+          </a:fontRef>
+        </p:style>
+        <p:txBody>
+          <a:bodyPr rtlCol="0" anchor="ctr"/>
+          <a:lstStyle/>
+          <a:p>
+            <a:pPr algn="ctr"/>
+            <a:r>
+              <a:rPr lang="en-CA" dirty="0" err="1"/>
+              <a:t>sMesh</a:t>
+            </a:r>
+            <a:endParaRPr lang="en-CA" dirty="0"/>
+          </a:p>
+          <a:p>
+            <a:pPr algn="ctr"/>
+            <a:r>
+              <a:rPr lang="en-CA" dirty="0"/>
+              <a:t>void </a:t>
+            </a:r>
+            <a:r>
+              <a:rPr lang="en-CA" dirty="0" err="1"/>
+              <a:t>MoveTo</a:t>
+            </a:r>
+            <a:r>
+              <a:rPr lang="en-CA" dirty="0"/>
+              <a:t>()</a:t>
+            </a:r>
+          </a:p>
+          <a:p>
+            <a:pPr algn="ctr"/>
+            <a:r>
+              <a:rPr lang="en-CA" dirty="0"/>
+              <a:t>void Update()</a:t>
+            </a:r>
+          </a:p>
+          <a:p>
+            <a:pPr algn="ctr"/>
+            <a:r>
+              <a:rPr lang="en-CA" dirty="0"/>
+              <a:t>bool </a:t>
+            </a:r>
+            <a:r>
+              <a:rPr lang="en-CA" dirty="0" err="1"/>
+              <a:t>isDone</a:t>
+            </a:r>
+            <a:r>
+              <a:rPr lang="en-CA" dirty="0"/>
+              <a:t>()</a:t>
+            </a:r>
+          </a:p>
+        </p:txBody>
+      </p:sp>
+      <p:sp>
+        <p:nvSpPr>
+          <p:cNvPr id="5" name="Rectangle: Rounded Corners 4">
+            <a:extLst>
+              <a:ext uri="{FF2B5EF4-FFF2-40B4-BE49-F238E27FC236}">
+                <a16:creationId xmlns:a16="http://schemas.microsoft.com/office/drawing/2014/main" id="{E2BCD55E-D1E3-99C6-3420-4F0FCE7ED5A6}"/>
+              </a:ext>
+            </a:extLst>
+          </p:cNvPr>
+          <p:cNvSpPr/>
+          <p:nvPr/>
+        </p:nvSpPr>
+        <p:spPr>
+          <a:xfrm>
+            <a:off x="9534832" y="4706937"/>
+            <a:ext cx="2094271" cy="1052052"/>
+          </a:xfrm>
+          <a:prstGeom prst="roundRect">
+            <a:avLst/>
+          </a:prstGeom>
+        </p:spPr>
+        <p:style>
+          <a:lnRef idx="2">
+            <a:schemeClr val="accent1">
+              <a:shade val="15000"/>
+            </a:schemeClr>
+          </a:lnRef>
+          <a:fillRef idx="1">
+            <a:schemeClr val="accent1"/>
+          </a:fillRef>
+          <a:effectRef idx="0">
+            <a:schemeClr val="accent1"/>
+          </a:effectRef>
+          <a:fontRef idx="minor">
+            <a:schemeClr val="lt1"/>
+          </a:fontRef>
+        </p:style>
+        <p:txBody>
+          <a:bodyPr rtlCol="0" anchor="ctr"/>
+          <a:lstStyle/>
+          <a:p>
+            <a:pPr algn="ctr"/>
+            <a:r>
+              <a:rPr lang="en-CA" dirty="0" err="1"/>
+              <a:t>sMesh</a:t>
+            </a:r>
+            <a:endParaRPr lang="en-CA" dirty="0"/>
+          </a:p>
+          <a:p>
+            <a:pPr algn="ctr"/>
+            <a:r>
+              <a:rPr lang="en-CA" dirty="0"/>
+              <a:t>vec3 position, etc.</a:t>
+            </a:r>
+          </a:p>
+        </p:txBody>
+      </p:sp>
+      <p:sp>
+        <p:nvSpPr>
+          <p:cNvPr id="6" name="Rectangle: Rounded Corners 5">
+            <a:extLst>
+              <a:ext uri="{FF2B5EF4-FFF2-40B4-BE49-F238E27FC236}">
+                <a16:creationId xmlns:a16="http://schemas.microsoft.com/office/drawing/2014/main" id="{786937E1-A2DA-2F07-B654-F5F8C45EA218}"/>
+              </a:ext>
+            </a:extLst>
+          </p:cNvPr>
+          <p:cNvSpPr/>
+          <p:nvPr/>
+        </p:nvSpPr>
+        <p:spPr>
+          <a:xfrm>
+            <a:off x="5348749" y="4706937"/>
+            <a:ext cx="2880851" cy="1403812"/>
+          </a:xfrm>
+          <a:prstGeom prst="roundRect">
+            <a:avLst/>
+          </a:prstGeom>
+        </p:spPr>
+        <p:style>
+          <a:lnRef idx="1">
+            <a:schemeClr val="accent6"/>
+          </a:lnRef>
+          <a:fillRef idx="3">
+            <a:schemeClr val="accent6"/>
+          </a:fillRef>
+          <a:effectRef idx="2">
+            <a:schemeClr val="accent6"/>
+          </a:effectRef>
+          <a:fontRef idx="minor">
+            <a:schemeClr val="lt1"/>
+          </a:fontRef>
+        </p:style>
+        <p:txBody>
+          <a:bodyPr rtlCol="0" anchor="ctr"/>
+          <a:lstStyle/>
+          <a:p>
+            <a:pPr algn="ctr"/>
+            <a:r>
+              <a:rPr lang="en-CA" dirty="0" err="1">
+                <a:solidFill>
+                  <a:schemeClr val="tx1"/>
+                </a:solidFill>
+              </a:rPr>
+              <a:t>cMoveToCommand</a:t>
+            </a:r>
+            <a:r>
+              <a:rPr lang="en-CA" dirty="0">
+                <a:solidFill>
+                  <a:schemeClr val="tx1"/>
+                </a:solidFill>
+              </a:rPr>
+              <a:t>()</a:t>
+            </a:r>
+          </a:p>
+          <a:p>
+            <a:pPr algn="ctr"/>
+            <a:r>
+              <a:rPr lang="en-CA" dirty="0">
+                <a:solidFill>
+                  <a:schemeClr val="tx1"/>
+                </a:solidFill>
+              </a:rPr>
+              <a:t>void Update()</a:t>
+            </a:r>
+          </a:p>
+          <a:p>
+            <a:pPr algn="ctr"/>
+            <a:r>
+              <a:rPr lang="en-CA" dirty="0">
+                <a:solidFill>
+                  <a:schemeClr val="tx1"/>
+                </a:solidFill>
+              </a:rPr>
+              <a:t>bool </a:t>
+            </a:r>
+            <a:r>
+              <a:rPr lang="en-CA" dirty="0" err="1">
+                <a:solidFill>
+                  <a:schemeClr val="tx1"/>
+                </a:solidFill>
+              </a:rPr>
+              <a:t>isDone</a:t>
+            </a:r>
+            <a:r>
+              <a:rPr lang="en-CA" dirty="0">
+                <a:solidFill>
+                  <a:schemeClr val="tx1"/>
+                </a:solidFill>
+              </a:rPr>
+              <a:t>()</a:t>
+            </a:r>
+          </a:p>
+        </p:txBody>
+      </p:sp>
+      <p:cxnSp>
+        <p:nvCxnSpPr>
+          <p:cNvPr id="8" name="Straight Arrow Connector 7">
+            <a:extLst>
+              <a:ext uri="{FF2B5EF4-FFF2-40B4-BE49-F238E27FC236}">
+                <a16:creationId xmlns:a16="http://schemas.microsoft.com/office/drawing/2014/main" id="{F4949D3E-5415-5C00-2E5D-C7FF5388F15D}"/>
+              </a:ext>
+            </a:extLst>
+          </p:cNvPr>
+          <p:cNvCxnSpPr>
+            <a:cxnSpLocks/>
+            <a:stCxn id="6" idx="3"/>
+            <a:endCxn id="5" idx="1"/>
+          </p:cNvCxnSpPr>
+          <p:nvPr/>
+        </p:nvCxnSpPr>
+        <p:spPr>
+          <a:xfrm flipV="1">
+            <a:off x="8229600" y="5232963"/>
+            <a:ext cx="1305232" cy="175880"/>
+          </a:xfrm>
+          <a:prstGeom prst="straightConnector1">
+            <a:avLst/>
+          </a:prstGeom>
+          <a:ln w="95250">
+            <a:tailEnd type="triangle"/>
+          </a:ln>
+        </p:spPr>
+        <p:style>
+          <a:lnRef idx="1">
+            <a:schemeClr val="accent1"/>
+          </a:lnRef>
+          <a:fillRef idx="0">
+            <a:schemeClr val="accent1"/>
+          </a:fillRef>
+          <a:effectRef idx="0">
+            <a:schemeClr val="accent1"/>
+          </a:effectRef>
+          <a:fontRef idx="minor">
+            <a:schemeClr val="tx1"/>
+          </a:fontRef>
+        </p:style>
+      </p:cxnSp>
+    </p:spTree>
+    <p:extLst>
+      <p:ext uri="{BB962C8B-B14F-4D97-AF65-F5344CB8AC3E}">
+        <p14:creationId xmlns:p14="http://schemas.microsoft.com/office/powerpoint/2010/main" val="129967462"/>
+      </p:ext>
+    </p:extLst>
+  </p:cSld>
+  <p:clrMapOvr>
+    <a:masterClrMapping/>
+  </p:clrMapOvr>
+</p:sld>
+</file>
+
+<file path=ppt/slides/slide22.xml><?xml version="1.0" encoding="utf-8"?>
+<p:sld xmlns:a="http://schemas.openxmlformats.org/drawingml/2006/main" xmlns:r="http://schemas.openxmlformats.org/officeDocument/2006/relationships" xmlns:p="http://schemas.openxmlformats.org/presentationml/2006/main">
+  <p:cSld>
+    <p:spTree>
+      <p:nvGrpSpPr>
+        <p:cNvPr id="1" name=""/>
+        <p:cNvGrpSpPr/>
+        <p:nvPr/>
+      </p:nvGrpSpPr>
+      <p:grpSpPr>
+        <a:xfrm>
+          <a:off x="0" y="0"/>
+          <a:ext cx="0" cy="0"/>
+          <a:chOff x="0" y="0"/>
+          <a:chExt cx="0" cy="0"/>
+        </a:xfrm>
+      </p:grpSpPr>
+      <p:sp>
+        <p:nvSpPr>
+          <p:cNvPr id="3" name="Content Placeholder 2">
+            <a:extLst>
+              <a:ext uri="{FF2B5EF4-FFF2-40B4-BE49-F238E27FC236}">
+                <a16:creationId xmlns:a16="http://schemas.microsoft.com/office/drawing/2014/main" id="{E63D159C-4821-CC59-5719-7CA99EA5BCC2}"/>
+              </a:ext>
+            </a:extLst>
+          </p:cNvPr>
+          <p:cNvSpPr>
+            <a:spLocks noGrp="1"/>
+          </p:cNvSpPr>
+          <p:nvPr>
+            <p:ph idx="1"/>
+          </p:nvPr>
+        </p:nvSpPr>
+        <p:spPr>
+          <a:xfrm>
+            <a:off x="612058" y="324362"/>
+            <a:ext cx="10515600" cy="2746375"/>
+          </a:xfrm>
+        </p:spPr>
+        <p:txBody>
+          <a:bodyPr/>
+          <a:lstStyle/>
+          <a:p>
+            <a:r>
+              <a:rPr lang="en-CA" dirty="0"/>
+              <a:t>Now the “commands” can be connected to any object (any mesh)</a:t>
+            </a:r>
+          </a:p>
+          <a:p>
+            <a:r>
+              <a:rPr lang="en-CA" dirty="0"/>
+              <a:t>Add them to a vector/list </a:t>
+            </a:r>
+            <a:r>
+              <a:rPr lang="en-CA" dirty="0">
+                <a:sym typeface="Wingdings" panose="05000000000000000000" pitchFamily="2" charset="2"/>
+              </a:rPr>
+              <a:t> go through them one at a time (until </a:t>
+            </a:r>
+            <a:r>
+              <a:rPr lang="en-CA" dirty="0" err="1">
+                <a:sym typeface="Wingdings" panose="05000000000000000000" pitchFamily="2" charset="2"/>
+              </a:rPr>
+              <a:t>isDone</a:t>
+            </a:r>
+            <a:r>
+              <a:rPr lang="en-CA" dirty="0">
+                <a:sym typeface="Wingdings" panose="05000000000000000000" pitchFamily="2" charset="2"/>
+              </a:rPr>
+              <a:t> returns true): gives us a set of “serial” commands</a:t>
+            </a:r>
+          </a:p>
+          <a:p>
+            <a:r>
+              <a:rPr lang="en-CA" dirty="0">
+                <a:sym typeface="Wingdings" panose="05000000000000000000" pitchFamily="2" charset="2"/>
+              </a:rPr>
+              <a:t>Add them to a vector/list  go through ALL of them at the same time, then we have a set of “parallel” commands</a:t>
+            </a:r>
+            <a:endParaRPr lang="en-CA" dirty="0"/>
+          </a:p>
+        </p:txBody>
+      </p:sp>
+    </p:spTree>
+    <p:extLst>
+      <p:ext uri="{BB962C8B-B14F-4D97-AF65-F5344CB8AC3E}">
+        <p14:creationId xmlns:p14="http://schemas.microsoft.com/office/powerpoint/2010/main" val="2271573120"/>
+      </p:ext>
+    </p:extLst>
+  </p:cSld>
+  <p:clrMapOvr>
+    <a:masterClrMapping/>
+  </p:clrMapOvr>
+</p:sld>
+</file>
+
+<file path=ppt/slides/slide23.xml><?xml version="1.0" encoding="utf-8"?>
+<p:sld xmlns:a="http://schemas.openxmlformats.org/drawingml/2006/main" xmlns:r="http://schemas.openxmlformats.org/officeDocument/2006/relationships" xmlns:p="http://schemas.openxmlformats.org/presentationml/2006/main">
+  <p:cSld>
+    <p:spTree>
+      <p:nvGrpSpPr>
+        <p:cNvPr id="1" name=""/>
+        <p:cNvGrpSpPr/>
+        <p:nvPr/>
+      </p:nvGrpSpPr>
+      <p:grpSpPr>
+        <a:xfrm>
+          <a:off x="0" y="0"/>
+          <a:ext cx="0" cy="0"/>
+          <a:chOff x="0" y="0"/>
+          <a:chExt cx="0" cy="0"/>
+        </a:xfrm>
+      </p:grpSpPr>
+      <p:sp>
+        <p:nvSpPr>
+          <p:cNvPr id="3" name="Content Placeholder 2">
+            <a:extLst>
+              <a:ext uri="{FF2B5EF4-FFF2-40B4-BE49-F238E27FC236}">
+                <a16:creationId xmlns:a16="http://schemas.microsoft.com/office/drawing/2014/main" id="{E63D159C-4821-CC59-5719-7CA99EA5BCC2}"/>
+              </a:ext>
+            </a:extLst>
+          </p:cNvPr>
+          <p:cNvSpPr>
+            <a:spLocks noGrp="1"/>
+          </p:cNvSpPr>
+          <p:nvPr>
+            <p:ph idx="1"/>
+          </p:nvPr>
+        </p:nvSpPr>
+        <p:spPr>
+          <a:xfrm>
+            <a:off x="612058" y="342235"/>
+            <a:ext cx="10515600" cy="1403812"/>
+          </a:xfrm>
+        </p:spPr>
+        <p:txBody>
+          <a:bodyPr/>
+          <a:lstStyle/>
+          <a:p>
+            <a:r>
+              <a:rPr lang="en-CA" dirty="0"/>
+              <a:t>Serial command: run each one until finished, then move to next…</a:t>
+            </a:r>
+          </a:p>
+        </p:txBody>
+      </p:sp>
+      <p:sp>
+        <p:nvSpPr>
+          <p:cNvPr id="5" name="Rectangle: Rounded Corners 4">
+            <a:extLst>
+              <a:ext uri="{FF2B5EF4-FFF2-40B4-BE49-F238E27FC236}">
+                <a16:creationId xmlns:a16="http://schemas.microsoft.com/office/drawing/2014/main" id="{E2BCD55E-D1E3-99C6-3420-4F0FCE7ED5A6}"/>
+              </a:ext>
+            </a:extLst>
+          </p:cNvPr>
+          <p:cNvSpPr/>
+          <p:nvPr/>
+        </p:nvSpPr>
+        <p:spPr>
+          <a:xfrm>
+            <a:off x="6528621" y="2649280"/>
+            <a:ext cx="2094271" cy="1052052"/>
+          </a:xfrm>
+          <a:prstGeom prst="roundRect">
+            <a:avLst/>
+          </a:prstGeom>
+        </p:spPr>
+        <p:style>
+          <a:lnRef idx="2">
+            <a:schemeClr val="accent1">
+              <a:shade val="15000"/>
+            </a:schemeClr>
+          </a:lnRef>
+          <a:fillRef idx="1">
+            <a:schemeClr val="accent1"/>
+          </a:fillRef>
+          <a:effectRef idx="0">
+            <a:schemeClr val="accent1"/>
+          </a:effectRef>
+          <a:fontRef idx="minor">
+            <a:schemeClr val="lt1"/>
+          </a:fontRef>
+        </p:style>
+        <p:txBody>
+          <a:bodyPr rtlCol="0" anchor="ctr"/>
+          <a:lstStyle/>
+          <a:p>
+            <a:pPr algn="ctr"/>
+            <a:r>
+              <a:rPr lang="en-CA" dirty="0" err="1"/>
+              <a:t>sMesh</a:t>
+            </a:r>
+            <a:endParaRPr lang="en-CA" dirty="0"/>
+          </a:p>
+          <a:p>
+            <a:pPr algn="ctr"/>
+            <a:r>
+              <a:rPr lang="en-CA" dirty="0"/>
+              <a:t>vec3 position, etc.</a:t>
+            </a:r>
+          </a:p>
+        </p:txBody>
+      </p:sp>
+      <p:sp>
+        <p:nvSpPr>
+          <p:cNvPr id="6" name="Rectangle: Rounded Corners 5">
+            <a:extLst>
+              <a:ext uri="{FF2B5EF4-FFF2-40B4-BE49-F238E27FC236}">
+                <a16:creationId xmlns:a16="http://schemas.microsoft.com/office/drawing/2014/main" id="{786937E1-A2DA-2F07-B654-F5F8C45EA218}"/>
+              </a:ext>
+            </a:extLst>
+          </p:cNvPr>
+          <p:cNvSpPr/>
+          <p:nvPr/>
+        </p:nvSpPr>
+        <p:spPr>
+          <a:xfrm>
+            <a:off x="1297860" y="1495758"/>
+            <a:ext cx="2880851" cy="1403812"/>
+          </a:xfrm>
+          <a:prstGeom prst="roundRect">
+            <a:avLst/>
+          </a:prstGeom>
+        </p:spPr>
+        <p:style>
+          <a:lnRef idx="1">
+            <a:schemeClr val="accent6"/>
+          </a:lnRef>
+          <a:fillRef idx="3">
+            <a:schemeClr val="accent6"/>
+          </a:fillRef>
+          <a:effectRef idx="2">
+            <a:schemeClr val="accent6"/>
+          </a:effectRef>
+          <a:fontRef idx="minor">
+            <a:schemeClr val="lt1"/>
+          </a:fontRef>
+        </p:style>
+        <p:txBody>
+          <a:bodyPr rtlCol="0" anchor="ctr"/>
+          <a:lstStyle/>
+          <a:p>
+            <a:pPr algn="ctr"/>
+            <a:r>
+              <a:rPr lang="en-CA" dirty="0" err="1">
+                <a:solidFill>
+                  <a:schemeClr val="tx1"/>
+                </a:solidFill>
+              </a:rPr>
+              <a:t>cMoveToCommand</a:t>
+            </a:r>
+            <a:r>
+              <a:rPr lang="en-CA" dirty="0">
+                <a:solidFill>
+                  <a:schemeClr val="tx1"/>
+                </a:solidFill>
+              </a:rPr>
+              <a:t>()</a:t>
+            </a:r>
+          </a:p>
+          <a:p>
+            <a:pPr algn="ctr"/>
+            <a:r>
+              <a:rPr lang="en-CA" dirty="0">
+                <a:solidFill>
+                  <a:schemeClr val="tx1"/>
+                </a:solidFill>
+              </a:rPr>
+              <a:t>void Update()</a:t>
+            </a:r>
+          </a:p>
+          <a:p>
+            <a:pPr algn="ctr"/>
+            <a:r>
+              <a:rPr lang="en-CA" dirty="0">
+                <a:solidFill>
+                  <a:schemeClr val="tx1"/>
+                </a:solidFill>
+              </a:rPr>
+              <a:t>bool </a:t>
+            </a:r>
+            <a:r>
+              <a:rPr lang="en-CA" dirty="0" err="1">
+                <a:solidFill>
+                  <a:schemeClr val="tx1"/>
+                </a:solidFill>
+              </a:rPr>
+              <a:t>isDone</a:t>
+            </a:r>
+            <a:r>
+              <a:rPr lang="en-CA" dirty="0">
+                <a:solidFill>
+                  <a:schemeClr val="tx1"/>
+                </a:solidFill>
+              </a:rPr>
+              <a:t>()</a:t>
+            </a:r>
+          </a:p>
+        </p:txBody>
+      </p:sp>
+      <p:cxnSp>
+        <p:nvCxnSpPr>
+          <p:cNvPr id="8" name="Straight Arrow Connector 7">
+            <a:extLst>
+              <a:ext uri="{FF2B5EF4-FFF2-40B4-BE49-F238E27FC236}">
+                <a16:creationId xmlns:a16="http://schemas.microsoft.com/office/drawing/2014/main" id="{F4949D3E-5415-5C00-2E5D-C7FF5388F15D}"/>
+              </a:ext>
+            </a:extLst>
+          </p:cNvPr>
+          <p:cNvCxnSpPr>
+            <a:cxnSpLocks/>
+            <a:stCxn id="6" idx="3"/>
+            <a:endCxn id="5" idx="1"/>
+          </p:cNvCxnSpPr>
+          <p:nvPr/>
+        </p:nvCxnSpPr>
+        <p:spPr>
+          <a:xfrm>
+            <a:off x="4178711" y="2197664"/>
+            <a:ext cx="2349910" cy="977642"/>
+          </a:xfrm>
+          <a:prstGeom prst="straightConnector1">
+            <a:avLst/>
+          </a:prstGeom>
+          <a:ln w="95250">
+            <a:tailEnd type="triangle"/>
+          </a:ln>
+        </p:spPr>
+        <p:style>
+          <a:lnRef idx="1">
+            <a:schemeClr val="accent1"/>
+          </a:lnRef>
+          <a:fillRef idx="0">
+            <a:schemeClr val="accent1"/>
+          </a:fillRef>
+          <a:effectRef idx="0">
+            <a:schemeClr val="accent1"/>
+          </a:effectRef>
+          <a:fontRef idx="minor">
+            <a:schemeClr val="tx1"/>
+          </a:fontRef>
+        </p:style>
+      </p:cxnSp>
+      <p:sp>
+        <p:nvSpPr>
+          <p:cNvPr id="10" name="Rectangle: Rounded Corners 9">
+            <a:extLst>
+              <a:ext uri="{FF2B5EF4-FFF2-40B4-BE49-F238E27FC236}">
+                <a16:creationId xmlns:a16="http://schemas.microsoft.com/office/drawing/2014/main" id="{8EC477E8-A50E-10E7-D403-41D99E4EEC62}"/>
+              </a:ext>
+            </a:extLst>
+          </p:cNvPr>
+          <p:cNvSpPr/>
+          <p:nvPr/>
+        </p:nvSpPr>
+        <p:spPr>
+          <a:xfrm>
+            <a:off x="1297859" y="3098234"/>
+            <a:ext cx="2880851" cy="1403812"/>
+          </a:xfrm>
+          <a:prstGeom prst="roundRect">
+            <a:avLst/>
+          </a:prstGeom>
+        </p:spPr>
+        <p:style>
+          <a:lnRef idx="1">
+            <a:schemeClr val="accent6"/>
+          </a:lnRef>
+          <a:fillRef idx="3">
+            <a:schemeClr val="accent6"/>
+          </a:fillRef>
+          <a:effectRef idx="2">
+            <a:schemeClr val="accent6"/>
+          </a:effectRef>
+          <a:fontRef idx="minor">
+            <a:schemeClr val="lt1"/>
+          </a:fontRef>
+        </p:style>
+        <p:txBody>
+          <a:bodyPr rtlCol="0" anchor="ctr"/>
+          <a:lstStyle/>
+          <a:p>
+            <a:pPr algn="ctr"/>
+            <a:r>
+              <a:rPr lang="en-CA" dirty="0" err="1">
+                <a:solidFill>
+                  <a:schemeClr val="tx1"/>
+                </a:solidFill>
+              </a:rPr>
+              <a:t>cMoveToCommand</a:t>
+            </a:r>
+            <a:r>
+              <a:rPr lang="en-CA" dirty="0">
+                <a:solidFill>
+                  <a:schemeClr val="tx1"/>
+                </a:solidFill>
+              </a:rPr>
+              <a:t>()</a:t>
+            </a:r>
+          </a:p>
+          <a:p>
+            <a:pPr algn="ctr"/>
+            <a:r>
+              <a:rPr lang="en-CA" dirty="0">
+                <a:solidFill>
+                  <a:schemeClr val="tx1"/>
+                </a:solidFill>
+              </a:rPr>
+              <a:t>void Update()</a:t>
+            </a:r>
+          </a:p>
+          <a:p>
+            <a:pPr algn="ctr"/>
+            <a:r>
+              <a:rPr lang="en-CA" dirty="0">
+                <a:solidFill>
+                  <a:schemeClr val="tx1"/>
+                </a:solidFill>
+              </a:rPr>
+              <a:t>bool </a:t>
+            </a:r>
+            <a:r>
+              <a:rPr lang="en-CA" dirty="0" err="1">
+                <a:solidFill>
+                  <a:schemeClr val="tx1"/>
+                </a:solidFill>
+              </a:rPr>
+              <a:t>isDone</a:t>
+            </a:r>
+            <a:r>
+              <a:rPr lang="en-CA" dirty="0">
+                <a:solidFill>
+                  <a:schemeClr val="tx1"/>
+                </a:solidFill>
+              </a:rPr>
+              <a:t>()</a:t>
+            </a:r>
+          </a:p>
+        </p:txBody>
+      </p:sp>
+      <p:sp>
+        <p:nvSpPr>
+          <p:cNvPr id="11" name="Rectangle: Rounded Corners 10">
+            <a:extLst>
+              <a:ext uri="{FF2B5EF4-FFF2-40B4-BE49-F238E27FC236}">
+                <a16:creationId xmlns:a16="http://schemas.microsoft.com/office/drawing/2014/main" id="{0AE7E425-57FA-10D3-906E-FE4829CEFE95}"/>
+              </a:ext>
+            </a:extLst>
+          </p:cNvPr>
+          <p:cNvSpPr/>
+          <p:nvPr/>
+        </p:nvSpPr>
+        <p:spPr>
+          <a:xfrm>
+            <a:off x="1297859" y="4660336"/>
+            <a:ext cx="2880851" cy="1403812"/>
+          </a:xfrm>
+          <a:prstGeom prst="roundRect">
+            <a:avLst/>
+          </a:prstGeom>
+        </p:spPr>
+        <p:style>
+          <a:lnRef idx="1">
+            <a:schemeClr val="accent6"/>
+          </a:lnRef>
+          <a:fillRef idx="3">
+            <a:schemeClr val="accent6"/>
+          </a:fillRef>
+          <a:effectRef idx="2">
+            <a:schemeClr val="accent6"/>
+          </a:effectRef>
+          <a:fontRef idx="minor">
+            <a:schemeClr val="lt1"/>
+          </a:fontRef>
+        </p:style>
+        <p:txBody>
+          <a:bodyPr rtlCol="0" anchor="ctr"/>
+          <a:lstStyle/>
+          <a:p>
+            <a:pPr algn="ctr"/>
+            <a:r>
+              <a:rPr lang="en-CA" dirty="0" err="1">
+                <a:solidFill>
+                  <a:schemeClr val="tx1"/>
+                </a:solidFill>
+              </a:rPr>
+              <a:t>cMoveToCommand</a:t>
+            </a:r>
+            <a:r>
+              <a:rPr lang="en-CA" dirty="0">
+                <a:solidFill>
+                  <a:schemeClr val="tx1"/>
+                </a:solidFill>
+              </a:rPr>
+              <a:t>()</a:t>
+            </a:r>
+          </a:p>
+          <a:p>
+            <a:pPr algn="ctr"/>
+            <a:r>
+              <a:rPr lang="en-CA" dirty="0">
+                <a:solidFill>
+                  <a:schemeClr val="tx1"/>
+                </a:solidFill>
+              </a:rPr>
+              <a:t>void Update()</a:t>
+            </a:r>
+          </a:p>
+          <a:p>
+            <a:pPr algn="ctr"/>
+            <a:r>
+              <a:rPr lang="en-CA" dirty="0">
+                <a:solidFill>
+                  <a:schemeClr val="tx1"/>
+                </a:solidFill>
+              </a:rPr>
+              <a:t>bool </a:t>
+            </a:r>
+            <a:r>
+              <a:rPr lang="en-CA" dirty="0" err="1">
+                <a:solidFill>
+                  <a:schemeClr val="tx1"/>
+                </a:solidFill>
+              </a:rPr>
+              <a:t>isDone</a:t>
+            </a:r>
+            <a:r>
+              <a:rPr lang="en-CA" dirty="0">
+                <a:solidFill>
+                  <a:schemeClr val="tx1"/>
+                </a:solidFill>
+              </a:rPr>
+              <a:t>()</a:t>
+            </a:r>
+          </a:p>
+        </p:txBody>
+      </p:sp>
+    </p:spTree>
+    <p:extLst>
+      <p:ext uri="{BB962C8B-B14F-4D97-AF65-F5344CB8AC3E}">
+        <p14:creationId xmlns:p14="http://schemas.microsoft.com/office/powerpoint/2010/main" val="3726643876"/>
+      </p:ext>
+    </p:extLst>
+  </p:cSld>
+  <p:clrMapOvr>
+    <a:masterClrMapping/>
+  </p:clrMapOvr>
+</p:sld>
+</file>
+
+<file path=ppt/slides/slide24.xml><?xml version="1.0" encoding="utf-8"?>
+<p:sld xmlns:a="http://schemas.openxmlformats.org/drawingml/2006/main" xmlns:r="http://schemas.openxmlformats.org/officeDocument/2006/relationships" xmlns:p="http://schemas.openxmlformats.org/presentationml/2006/main">
+  <p:cSld>
+    <p:spTree>
+      <p:nvGrpSpPr>
+        <p:cNvPr id="1" name=""/>
+        <p:cNvGrpSpPr/>
+        <p:nvPr/>
+      </p:nvGrpSpPr>
+      <p:grpSpPr>
+        <a:xfrm>
+          <a:off x="0" y="0"/>
+          <a:ext cx="0" cy="0"/>
+          <a:chOff x="0" y="0"/>
+          <a:chExt cx="0" cy="0"/>
+        </a:xfrm>
+      </p:grpSpPr>
+      <p:sp>
+        <p:nvSpPr>
+          <p:cNvPr id="3" name="Content Placeholder 2">
+            <a:extLst>
+              <a:ext uri="{FF2B5EF4-FFF2-40B4-BE49-F238E27FC236}">
+                <a16:creationId xmlns:a16="http://schemas.microsoft.com/office/drawing/2014/main" id="{E63D159C-4821-CC59-5719-7CA99EA5BCC2}"/>
+              </a:ext>
+            </a:extLst>
+          </p:cNvPr>
+          <p:cNvSpPr>
+            <a:spLocks noGrp="1"/>
+          </p:cNvSpPr>
+          <p:nvPr>
+            <p:ph idx="1"/>
+          </p:nvPr>
+        </p:nvSpPr>
+        <p:spPr>
+          <a:xfrm>
+            <a:off x="612058" y="342235"/>
+            <a:ext cx="10515600" cy="719649"/>
+          </a:xfrm>
+        </p:spPr>
+        <p:txBody>
+          <a:bodyPr/>
+          <a:lstStyle/>
+          <a:p>
+            <a:r>
+              <a:rPr lang="en-CA" dirty="0"/>
+              <a:t>Parallel command: run all of them at the same time…</a:t>
+            </a:r>
+          </a:p>
+        </p:txBody>
+      </p:sp>
+      <p:sp>
+        <p:nvSpPr>
+          <p:cNvPr id="5" name="Rectangle: Rounded Corners 4">
+            <a:extLst>
+              <a:ext uri="{FF2B5EF4-FFF2-40B4-BE49-F238E27FC236}">
+                <a16:creationId xmlns:a16="http://schemas.microsoft.com/office/drawing/2014/main" id="{E2BCD55E-D1E3-99C6-3420-4F0FCE7ED5A6}"/>
+              </a:ext>
+            </a:extLst>
+          </p:cNvPr>
+          <p:cNvSpPr/>
+          <p:nvPr/>
+        </p:nvSpPr>
+        <p:spPr>
+          <a:xfrm>
+            <a:off x="6528621" y="2649280"/>
+            <a:ext cx="2094271" cy="1052052"/>
+          </a:xfrm>
+          <a:prstGeom prst="roundRect">
+            <a:avLst/>
+          </a:prstGeom>
+        </p:spPr>
+        <p:style>
+          <a:lnRef idx="2">
+            <a:schemeClr val="accent1">
+              <a:shade val="15000"/>
+            </a:schemeClr>
+          </a:lnRef>
+          <a:fillRef idx="1">
+            <a:schemeClr val="accent1"/>
+          </a:fillRef>
+          <a:effectRef idx="0">
+            <a:schemeClr val="accent1"/>
+          </a:effectRef>
+          <a:fontRef idx="minor">
+            <a:schemeClr val="lt1"/>
+          </a:fontRef>
+        </p:style>
+        <p:txBody>
+          <a:bodyPr rtlCol="0" anchor="ctr"/>
+          <a:lstStyle/>
+          <a:p>
+            <a:pPr algn="ctr"/>
+            <a:r>
+              <a:rPr lang="en-CA" dirty="0" err="1"/>
+              <a:t>sMesh</a:t>
+            </a:r>
+            <a:endParaRPr lang="en-CA" dirty="0"/>
+          </a:p>
+          <a:p>
+            <a:pPr algn="ctr"/>
+            <a:r>
+              <a:rPr lang="en-CA" dirty="0"/>
+              <a:t>vec3 position, etc.</a:t>
+            </a:r>
+          </a:p>
+        </p:txBody>
+      </p:sp>
+      <p:sp>
+        <p:nvSpPr>
+          <p:cNvPr id="6" name="Rectangle: Rounded Corners 5">
+            <a:extLst>
+              <a:ext uri="{FF2B5EF4-FFF2-40B4-BE49-F238E27FC236}">
+                <a16:creationId xmlns:a16="http://schemas.microsoft.com/office/drawing/2014/main" id="{786937E1-A2DA-2F07-B654-F5F8C45EA218}"/>
+              </a:ext>
+            </a:extLst>
+          </p:cNvPr>
+          <p:cNvSpPr/>
+          <p:nvPr/>
+        </p:nvSpPr>
+        <p:spPr>
+          <a:xfrm>
+            <a:off x="612058" y="1495758"/>
+            <a:ext cx="3566653" cy="1403812"/>
+          </a:xfrm>
+          <a:prstGeom prst="roundRect">
+            <a:avLst/>
+          </a:prstGeom>
+        </p:spPr>
+        <p:style>
+          <a:lnRef idx="1">
+            <a:schemeClr val="accent6"/>
+          </a:lnRef>
+          <a:fillRef idx="3">
+            <a:schemeClr val="accent6"/>
+          </a:fillRef>
+          <a:effectRef idx="2">
+            <a:schemeClr val="accent6"/>
+          </a:effectRef>
+          <a:fontRef idx="minor">
+            <a:schemeClr val="lt1"/>
+          </a:fontRef>
+        </p:style>
+        <p:txBody>
+          <a:bodyPr rtlCol="0" anchor="ctr"/>
+          <a:lstStyle/>
+          <a:p>
+            <a:pPr algn="ctr"/>
+            <a:r>
+              <a:rPr lang="en-CA" dirty="0" err="1">
+                <a:solidFill>
+                  <a:schemeClr val="tx1"/>
+                </a:solidFill>
+              </a:rPr>
+              <a:t>cMoveToCommand</a:t>
+            </a:r>
+            <a:r>
+              <a:rPr lang="en-CA" dirty="0">
+                <a:solidFill>
+                  <a:schemeClr val="tx1"/>
+                </a:solidFill>
+              </a:rPr>
+              <a:t>()</a:t>
+            </a:r>
+          </a:p>
+          <a:p>
+            <a:pPr algn="ctr"/>
+            <a:r>
+              <a:rPr lang="en-CA" dirty="0">
+                <a:solidFill>
+                  <a:schemeClr val="tx1"/>
+                </a:solidFill>
+              </a:rPr>
+              <a:t>void </a:t>
+            </a:r>
+            <a:r>
+              <a:rPr lang="en-CA" b="1" dirty="0">
+                <a:solidFill>
+                  <a:schemeClr val="tx1"/>
+                </a:solidFill>
+              </a:rPr>
+              <a:t>Update()</a:t>
+            </a:r>
+          </a:p>
+          <a:p>
+            <a:pPr algn="ctr"/>
+            <a:r>
+              <a:rPr lang="en-CA" dirty="0">
+                <a:solidFill>
+                  <a:schemeClr val="tx1"/>
+                </a:solidFill>
+              </a:rPr>
+              <a:t>bool </a:t>
+            </a:r>
+            <a:r>
+              <a:rPr lang="en-CA" dirty="0" err="1">
+                <a:solidFill>
+                  <a:schemeClr val="tx1"/>
+                </a:solidFill>
+              </a:rPr>
+              <a:t>isDone</a:t>
+            </a:r>
+            <a:r>
+              <a:rPr lang="en-CA" dirty="0">
+                <a:solidFill>
+                  <a:schemeClr val="tx1"/>
+                </a:solidFill>
+              </a:rPr>
+              <a:t>()</a:t>
+            </a:r>
+          </a:p>
+        </p:txBody>
+      </p:sp>
+      <p:cxnSp>
+        <p:nvCxnSpPr>
+          <p:cNvPr id="8" name="Straight Arrow Connector 7">
+            <a:extLst>
+              <a:ext uri="{FF2B5EF4-FFF2-40B4-BE49-F238E27FC236}">
+                <a16:creationId xmlns:a16="http://schemas.microsoft.com/office/drawing/2014/main" id="{F4949D3E-5415-5C00-2E5D-C7FF5388F15D}"/>
+              </a:ext>
+            </a:extLst>
+          </p:cNvPr>
+          <p:cNvCxnSpPr>
+            <a:cxnSpLocks/>
+            <a:stCxn id="6" idx="3"/>
+            <a:endCxn id="5" idx="1"/>
+          </p:cNvCxnSpPr>
+          <p:nvPr/>
+        </p:nvCxnSpPr>
+        <p:spPr>
+          <a:xfrm>
+            <a:off x="4178711" y="2197664"/>
+            <a:ext cx="2349910" cy="977642"/>
+          </a:xfrm>
+          <a:prstGeom prst="straightConnector1">
+            <a:avLst/>
+          </a:prstGeom>
+          <a:ln w="95250">
+            <a:tailEnd type="triangle"/>
+          </a:ln>
+        </p:spPr>
+        <p:style>
+          <a:lnRef idx="1">
+            <a:schemeClr val="accent1"/>
+          </a:lnRef>
+          <a:fillRef idx="0">
+            <a:schemeClr val="accent1"/>
+          </a:fillRef>
+          <a:effectRef idx="0">
+            <a:schemeClr val="accent1"/>
+          </a:effectRef>
+          <a:fontRef idx="minor">
+            <a:schemeClr val="tx1"/>
+          </a:fontRef>
+        </p:style>
+      </p:cxnSp>
+      <p:sp>
+        <p:nvSpPr>
+          <p:cNvPr id="10" name="Rectangle: Rounded Corners 9">
+            <a:extLst>
+              <a:ext uri="{FF2B5EF4-FFF2-40B4-BE49-F238E27FC236}">
+                <a16:creationId xmlns:a16="http://schemas.microsoft.com/office/drawing/2014/main" id="{8EC477E8-A50E-10E7-D403-41D99E4EEC62}"/>
+              </a:ext>
+            </a:extLst>
+          </p:cNvPr>
+          <p:cNvSpPr/>
+          <p:nvPr/>
+        </p:nvSpPr>
+        <p:spPr>
+          <a:xfrm>
+            <a:off x="612059" y="3098234"/>
+            <a:ext cx="3566652" cy="1403812"/>
+          </a:xfrm>
+          <a:prstGeom prst="roundRect">
+            <a:avLst/>
+          </a:prstGeom>
+        </p:spPr>
+        <p:style>
+          <a:lnRef idx="1">
+            <a:schemeClr val="accent6"/>
+          </a:lnRef>
+          <a:fillRef idx="3">
+            <a:schemeClr val="accent6"/>
+          </a:fillRef>
+          <a:effectRef idx="2">
+            <a:schemeClr val="accent6"/>
+          </a:effectRef>
+          <a:fontRef idx="minor">
+            <a:schemeClr val="lt1"/>
+          </a:fontRef>
+        </p:style>
+        <p:txBody>
+          <a:bodyPr rtlCol="0" anchor="ctr"/>
+          <a:lstStyle/>
+          <a:p>
+            <a:pPr algn="ctr"/>
+            <a:r>
+              <a:rPr lang="en-CA" dirty="0" err="1">
+                <a:solidFill>
+                  <a:schemeClr val="tx1"/>
+                </a:solidFill>
+              </a:rPr>
+              <a:t>cRotateToCommand</a:t>
+            </a:r>
+            <a:r>
+              <a:rPr lang="en-CA" dirty="0">
+                <a:solidFill>
+                  <a:schemeClr val="tx1"/>
+                </a:solidFill>
+              </a:rPr>
+              <a:t>()</a:t>
+            </a:r>
+          </a:p>
+          <a:p>
+            <a:pPr algn="ctr"/>
+            <a:r>
+              <a:rPr lang="en-CA" dirty="0">
+                <a:solidFill>
+                  <a:schemeClr val="tx1"/>
+                </a:solidFill>
+              </a:rPr>
+              <a:t>void </a:t>
+            </a:r>
+            <a:r>
+              <a:rPr lang="en-CA" b="1" dirty="0">
+                <a:solidFill>
+                  <a:schemeClr val="tx1"/>
+                </a:solidFill>
+              </a:rPr>
+              <a:t>Update()</a:t>
+            </a:r>
+          </a:p>
+          <a:p>
+            <a:pPr algn="ctr"/>
+            <a:r>
+              <a:rPr lang="en-CA" dirty="0">
+                <a:solidFill>
+                  <a:schemeClr val="tx1"/>
+                </a:solidFill>
+              </a:rPr>
+              <a:t>bool </a:t>
+            </a:r>
+            <a:r>
+              <a:rPr lang="en-CA" dirty="0" err="1">
+                <a:solidFill>
+                  <a:schemeClr val="tx1"/>
+                </a:solidFill>
+              </a:rPr>
+              <a:t>isDone</a:t>
+            </a:r>
+            <a:r>
+              <a:rPr lang="en-CA" dirty="0">
+                <a:solidFill>
+                  <a:schemeClr val="tx1"/>
+                </a:solidFill>
+              </a:rPr>
+              <a:t>()</a:t>
+            </a:r>
+          </a:p>
+        </p:txBody>
+      </p:sp>
+      <p:sp>
+        <p:nvSpPr>
+          <p:cNvPr id="11" name="Rectangle: Rounded Corners 10">
+            <a:extLst>
+              <a:ext uri="{FF2B5EF4-FFF2-40B4-BE49-F238E27FC236}">
+                <a16:creationId xmlns:a16="http://schemas.microsoft.com/office/drawing/2014/main" id="{0AE7E425-57FA-10D3-906E-FE4829CEFE95}"/>
+              </a:ext>
+            </a:extLst>
+          </p:cNvPr>
+          <p:cNvSpPr/>
+          <p:nvPr/>
+        </p:nvSpPr>
+        <p:spPr>
+          <a:xfrm>
+            <a:off x="612059" y="4660336"/>
+            <a:ext cx="3566652" cy="1403812"/>
+          </a:xfrm>
+          <a:prstGeom prst="roundRect">
+            <a:avLst/>
+          </a:prstGeom>
+        </p:spPr>
+        <p:style>
+          <a:lnRef idx="1">
+            <a:schemeClr val="accent6"/>
+          </a:lnRef>
+          <a:fillRef idx="3">
+            <a:schemeClr val="accent6"/>
+          </a:fillRef>
+          <a:effectRef idx="2">
+            <a:schemeClr val="accent6"/>
+          </a:effectRef>
+          <a:fontRef idx="minor">
+            <a:schemeClr val="lt1"/>
+          </a:fontRef>
+        </p:style>
+        <p:txBody>
+          <a:bodyPr rtlCol="0" anchor="ctr"/>
+          <a:lstStyle/>
+          <a:p>
+            <a:pPr algn="ctr"/>
+            <a:r>
+              <a:rPr lang="en-CA" dirty="0" err="1">
+                <a:solidFill>
+                  <a:schemeClr val="tx1"/>
+                </a:solidFill>
+              </a:rPr>
+              <a:t>cEngageThrustersCommand</a:t>
+            </a:r>
+            <a:r>
+              <a:rPr lang="en-CA" dirty="0">
+                <a:solidFill>
+                  <a:schemeClr val="tx1"/>
+                </a:solidFill>
+              </a:rPr>
+              <a:t>()</a:t>
+            </a:r>
+          </a:p>
+          <a:p>
+            <a:pPr algn="ctr"/>
+            <a:r>
+              <a:rPr lang="en-CA" dirty="0">
+                <a:solidFill>
+                  <a:schemeClr val="tx1"/>
+                </a:solidFill>
+              </a:rPr>
+              <a:t>void </a:t>
+            </a:r>
+            <a:r>
+              <a:rPr lang="en-CA" i="1" dirty="0">
+                <a:solidFill>
+                  <a:schemeClr val="tx1"/>
+                </a:solidFill>
+              </a:rPr>
+              <a:t>Update()</a:t>
+            </a:r>
+          </a:p>
+          <a:p>
+            <a:pPr algn="ctr"/>
+            <a:r>
+              <a:rPr lang="en-CA" dirty="0">
+                <a:solidFill>
+                  <a:schemeClr val="tx1"/>
+                </a:solidFill>
+              </a:rPr>
+              <a:t>bool </a:t>
+            </a:r>
+            <a:r>
+              <a:rPr lang="en-CA" dirty="0" err="1">
+                <a:solidFill>
+                  <a:schemeClr val="tx1"/>
+                </a:solidFill>
+              </a:rPr>
+              <a:t>isDone</a:t>
+            </a:r>
+            <a:r>
+              <a:rPr lang="en-CA" dirty="0">
+                <a:solidFill>
+                  <a:schemeClr val="tx1"/>
+                </a:solidFill>
+              </a:rPr>
+              <a:t>()</a:t>
+            </a:r>
+          </a:p>
+        </p:txBody>
+      </p:sp>
+      <p:cxnSp>
+        <p:nvCxnSpPr>
+          <p:cNvPr id="4" name="Straight Arrow Connector 3">
+            <a:extLst>
+              <a:ext uri="{FF2B5EF4-FFF2-40B4-BE49-F238E27FC236}">
+                <a16:creationId xmlns:a16="http://schemas.microsoft.com/office/drawing/2014/main" id="{9256ED91-290C-C0CA-0094-9369B19625C9}"/>
+              </a:ext>
+            </a:extLst>
+          </p:cNvPr>
+          <p:cNvCxnSpPr>
+            <a:cxnSpLocks/>
+            <a:stCxn id="10" idx="3"/>
+            <a:endCxn id="5" idx="1"/>
+          </p:cNvCxnSpPr>
+          <p:nvPr/>
+        </p:nvCxnSpPr>
+        <p:spPr>
+          <a:xfrm flipV="1">
+            <a:off x="4178711" y="3175306"/>
+            <a:ext cx="2349910" cy="624834"/>
+          </a:xfrm>
+          <a:prstGeom prst="straightConnector1">
+            <a:avLst/>
+          </a:prstGeom>
+          <a:ln w="95250">
+            <a:tailEnd type="triangle"/>
+          </a:ln>
+        </p:spPr>
+        <p:style>
+          <a:lnRef idx="1">
+            <a:schemeClr val="accent1"/>
+          </a:lnRef>
+          <a:fillRef idx="0">
+            <a:schemeClr val="accent1"/>
+          </a:fillRef>
+          <a:effectRef idx="0">
+            <a:schemeClr val="accent1"/>
+          </a:effectRef>
+          <a:fontRef idx="minor">
+            <a:schemeClr val="tx1"/>
+          </a:fontRef>
+        </p:style>
+      </p:cxnSp>
+      <p:cxnSp>
+        <p:nvCxnSpPr>
+          <p:cNvPr id="12" name="Straight Arrow Connector 11">
+            <a:extLst>
+              <a:ext uri="{FF2B5EF4-FFF2-40B4-BE49-F238E27FC236}">
+                <a16:creationId xmlns:a16="http://schemas.microsoft.com/office/drawing/2014/main" id="{427BB56C-63C9-736E-96CD-E0A120DF3407}"/>
+              </a:ext>
+            </a:extLst>
+          </p:cNvPr>
+          <p:cNvCxnSpPr>
+            <a:cxnSpLocks/>
+            <a:endCxn id="5" idx="1"/>
+          </p:cNvCxnSpPr>
+          <p:nvPr/>
+        </p:nvCxnSpPr>
+        <p:spPr>
+          <a:xfrm flipV="1">
+            <a:off x="4178711" y="3175306"/>
+            <a:ext cx="2349910" cy="1996462"/>
+          </a:xfrm>
+          <a:prstGeom prst="straightConnector1">
+            <a:avLst/>
+          </a:prstGeom>
+          <a:ln w="95250">
+            <a:tailEnd type="triangle"/>
+          </a:ln>
+        </p:spPr>
+        <p:style>
+          <a:lnRef idx="1">
+            <a:schemeClr val="accent1"/>
+          </a:lnRef>
+          <a:fillRef idx="0">
+            <a:schemeClr val="accent1"/>
+          </a:fillRef>
+          <a:effectRef idx="0">
+            <a:schemeClr val="accent1"/>
+          </a:effectRef>
+          <a:fontRef idx="minor">
+            <a:schemeClr val="tx1"/>
+          </a:fontRef>
+        </p:style>
+      </p:cxnSp>
+    </p:spTree>
+    <p:extLst>
+      <p:ext uri="{BB962C8B-B14F-4D97-AF65-F5344CB8AC3E}">
+        <p14:creationId xmlns:p14="http://schemas.microsoft.com/office/powerpoint/2010/main" val="3154517700"/>
+      </p:ext>
+    </p:extLst>
+  </p:cSld>
+  <p:clrMapOvr>
+    <a:masterClrMapping/>
+  </p:clrMapOvr>
+</p:sld>
+</file>
+
+<file path=ppt/slides/slide25.xml><?xml version="1.0" encoding="utf-8"?>
+<p:sld xmlns:a="http://schemas.openxmlformats.org/drawingml/2006/main" xmlns:r="http://schemas.openxmlformats.org/officeDocument/2006/relationships" xmlns:p="http://schemas.openxmlformats.org/presentationml/2006/main">
+  <p:cSld>
+    <p:spTree>
+      <p:nvGrpSpPr>
+        <p:cNvPr id="1" name=""/>
+        <p:cNvGrpSpPr/>
+        <p:nvPr/>
+      </p:nvGrpSpPr>
+      <p:grpSpPr>
+        <a:xfrm>
+          <a:off x="0" y="0"/>
+          <a:ext cx="0" cy="0"/>
+          <a:chOff x="0" y="0"/>
+          <a:chExt cx="0" cy="0"/>
+        </a:xfrm>
+      </p:grpSpPr>
+      <p:sp>
+        <p:nvSpPr>
+          <p:cNvPr id="3" name="Content Placeholder 2">
+            <a:extLst>
+              <a:ext uri="{FF2B5EF4-FFF2-40B4-BE49-F238E27FC236}">
+                <a16:creationId xmlns:a16="http://schemas.microsoft.com/office/drawing/2014/main" id="{E63D159C-4821-CC59-5719-7CA99EA5BCC2}"/>
+              </a:ext>
+            </a:extLst>
+          </p:cNvPr>
+          <p:cNvSpPr>
+            <a:spLocks noGrp="1"/>
+          </p:cNvSpPr>
+          <p:nvPr>
+            <p:ph idx="1"/>
+          </p:nvPr>
+        </p:nvSpPr>
+        <p:spPr>
+          <a:xfrm>
+            <a:off x="612058" y="324362"/>
+            <a:ext cx="10515600" cy="5801135"/>
+          </a:xfrm>
+        </p:spPr>
+        <p:txBody>
+          <a:bodyPr/>
+          <a:lstStyle/>
+          <a:p>
+            <a:r>
+              <a:rPr lang="en-CA" dirty="0"/>
+              <a:t>We have to add something to manage these commands.</a:t>
+            </a:r>
+          </a:p>
+          <a:p>
+            <a:r>
+              <a:rPr lang="en-CA" dirty="0"/>
+              <a:t>My suggestion is:</a:t>
+            </a:r>
+          </a:p>
+          <a:p>
+            <a:pPr lvl="1"/>
+            <a:r>
+              <a:rPr lang="en-CA" sz="2800" dirty="0"/>
+              <a:t>Command Group:</a:t>
+            </a:r>
+          </a:p>
+          <a:p>
+            <a:pPr lvl="2"/>
+            <a:r>
+              <a:rPr lang="en-CA" sz="2800" dirty="0"/>
+              <a:t>Has a serial and parallel list of commands (a vector)</a:t>
+            </a:r>
+          </a:p>
+          <a:p>
+            <a:pPr lvl="1"/>
+            <a:r>
+              <a:rPr lang="en-CA" sz="2800" dirty="0"/>
+              <a:t>Some Commands that have a common interface</a:t>
+            </a:r>
+          </a:p>
+          <a:p>
+            <a:pPr lvl="2"/>
+            <a:r>
+              <a:rPr lang="en-CA" sz="2400" dirty="0" err="1"/>
+              <a:t>iCommand</a:t>
+            </a:r>
+            <a:r>
+              <a:rPr lang="en-CA" sz="2400" dirty="0"/>
+              <a:t> interface that ALL commands have. </a:t>
+            </a:r>
+          </a:p>
+          <a:p>
+            <a:pPr lvl="2"/>
+            <a:r>
+              <a:rPr lang="en-CA" sz="2400" dirty="0"/>
+              <a:t>Using a variation of the FIRST Robotics, I’ve got:</a:t>
+            </a:r>
+          </a:p>
+          <a:p>
+            <a:pPr lvl="3"/>
+            <a:r>
+              <a:rPr lang="en-US" sz="2000" dirty="0">
+                <a:solidFill>
+                  <a:srgbClr val="0000FF"/>
+                </a:solidFill>
+                <a:highlight>
+                  <a:srgbClr val="FFFFFF"/>
+                </a:highlight>
+                <a:latin typeface="Cascadia Mono" panose="020B0609020000020004" pitchFamily="49" charset="0"/>
+              </a:rPr>
+              <a:t>void</a:t>
+            </a:r>
+            <a:r>
+              <a:rPr lang="en-US" sz="2000" dirty="0">
+                <a:solidFill>
+                  <a:srgbClr val="000000"/>
+                </a:solidFill>
+                <a:highlight>
+                  <a:srgbClr val="FFFFFF"/>
+                </a:highlight>
+                <a:latin typeface="Cascadia Mono" panose="020B0609020000020004" pitchFamily="49" charset="0"/>
+              </a:rPr>
+              <a:t> </a:t>
+            </a:r>
+            <a:r>
+              <a:rPr lang="en-US" sz="2000" dirty="0" err="1">
+                <a:solidFill>
+                  <a:srgbClr val="000000"/>
+                </a:solidFill>
+                <a:highlight>
+                  <a:srgbClr val="FFFFFF"/>
+                </a:highlight>
+                <a:latin typeface="Cascadia Mono" panose="020B0609020000020004" pitchFamily="49" charset="0"/>
+              </a:rPr>
+              <a:t>OnStart</a:t>
+            </a:r>
+            <a:r>
+              <a:rPr lang="en-US" sz="2000" dirty="0">
+                <a:solidFill>
+                  <a:srgbClr val="000000"/>
+                </a:solidFill>
+                <a:highlight>
+                  <a:srgbClr val="FFFFFF"/>
+                </a:highlight>
+                <a:latin typeface="Cascadia Mono" panose="020B0609020000020004" pitchFamily="49" charset="0"/>
+              </a:rPr>
+              <a:t>(</a:t>
+            </a:r>
+            <a:r>
+              <a:rPr lang="en-US" sz="2000" dirty="0">
+                <a:solidFill>
+                  <a:srgbClr val="0000FF"/>
+                </a:solidFill>
+                <a:highlight>
+                  <a:srgbClr val="FFFFFF"/>
+                </a:highlight>
+                <a:latin typeface="Cascadia Mono" panose="020B0609020000020004" pitchFamily="49" charset="0"/>
+              </a:rPr>
+              <a:t>void</a:t>
+            </a:r>
+            <a:r>
+              <a:rPr lang="en-US" sz="2000" dirty="0">
+                <a:solidFill>
+                  <a:srgbClr val="000000"/>
+                </a:solidFill>
+                <a:highlight>
+                  <a:srgbClr val="FFFFFF"/>
+                </a:highlight>
+                <a:latin typeface="Cascadia Mono" panose="020B0609020000020004" pitchFamily="49" charset="0"/>
+              </a:rPr>
+              <a:t>);</a:t>
+            </a:r>
+          </a:p>
+          <a:p>
+            <a:pPr lvl="3"/>
+            <a:r>
+              <a:rPr lang="en-CA" sz="2000" dirty="0">
+                <a:solidFill>
+                  <a:srgbClr val="0000FF"/>
+                </a:solidFill>
+                <a:highlight>
+                  <a:srgbClr val="FFFFFF"/>
+                </a:highlight>
+                <a:latin typeface="Cascadia Mono" panose="020B0609020000020004" pitchFamily="49" charset="0"/>
+              </a:rPr>
+              <a:t>void</a:t>
+            </a:r>
+            <a:r>
+              <a:rPr lang="en-CA" sz="2000" dirty="0">
+                <a:solidFill>
+                  <a:srgbClr val="000000"/>
+                </a:solidFill>
+                <a:highlight>
+                  <a:srgbClr val="FFFFFF"/>
+                </a:highlight>
+                <a:latin typeface="Cascadia Mono" panose="020B0609020000020004" pitchFamily="49" charset="0"/>
+              </a:rPr>
+              <a:t> Update(</a:t>
+            </a:r>
+            <a:r>
+              <a:rPr lang="en-CA" sz="2000" dirty="0">
+                <a:solidFill>
+                  <a:srgbClr val="0000FF"/>
+                </a:solidFill>
+                <a:highlight>
+                  <a:srgbClr val="FFFFFF"/>
+                </a:highlight>
+                <a:latin typeface="Cascadia Mono" panose="020B0609020000020004" pitchFamily="49" charset="0"/>
+              </a:rPr>
+              <a:t>double</a:t>
+            </a:r>
+            <a:r>
+              <a:rPr lang="en-CA" sz="2000" dirty="0">
+                <a:solidFill>
+                  <a:srgbClr val="000000"/>
+                </a:solidFill>
+                <a:highlight>
+                  <a:srgbClr val="FFFFFF"/>
+                </a:highlight>
+                <a:latin typeface="Cascadia Mono" panose="020B0609020000020004" pitchFamily="49" charset="0"/>
+              </a:rPr>
+              <a:t> </a:t>
+            </a:r>
+            <a:r>
+              <a:rPr lang="en-CA" sz="2000" dirty="0" err="1">
+                <a:solidFill>
+                  <a:srgbClr val="808080"/>
+                </a:solidFill>
+                <a:highlight>
+                  <a:srgbClr val="FFFFFF"/>
+                </a:highlight>
+                <a:latin typeface="Cascadia Mono" panose="020B0609020000020004" pitchFamily="49" charset="0"/>
+              </a:rPr>
+              <a:t>deltaTime</a:t>
+            </a:r>
+            <a:r>
+              <a:rPr lang="en-CA" sz="2000" dirty="0">
+                <a:solidFill>
+                  <a:srgbClr val="000000"/>
+                </a:solidFill>
+                <a:highlight>
+                  <a:srgbClr val="FFFFFF"/>
+                </a:highlight>
+                <a:latin typeface="Cascadia Mono" panose="020B0609020000020004" pitchFamily="49" charset="0"/>
+              </a:rPr>
+              <a:t>);</a:t>
+            </a:r>
+          </a:p>
+          <a:p>
+            <a:pPr lvl="3"/>
+            <a:r>
+              <a:rPr lang="en-US" sz="2000" dirty="0">
+                <a:solidFill>
+                  <a:srgbClr val="0000FF"/>
+                </a:solidFill>
+                <a:highlight>
+                  <a:srgbClr val="FFFFFF"/>
+                </a:highlight>
+                <a:latin typeface="Cascadia Mono" panose="020B0609020000020004" pitchFamily="49" charset="0"/>
+              </a:rPr>
+              <a:t>bool</a:t>
+            </a:r>
+            <a:r>
+              <a:rPr lang="en-US" sz="2000" dirty="0">
+                <a:solidFill>
+                  <a:srgbClr val="000000"/>
+                </a:solidFill>
+                <a:highlight>
+                  <a:srgbClr val="FFFFFF"/>
+                </a:highlight>
+                <a:latin typeface="Cascadia Mono" panose="020B0609020000020004" pitchFamily="49" charset="0"/>
+              </a:rPr>
+              <a:t> </a:t>
+            </a:r>
+            <a:r>
+              <a:rPr lang="en-US" sz="2000" dirty="0" err="1">
+                <a:solidFill>
+                  <a:srgbClr val="000000"/>
+                </a:solidFill>
+                <a:highlight>
+                  <a:srgbClr val="FFFFFF"/>
+                </a:highlight>
+                <a:latin typeface="Cascadia Mono" panose="020B0609020000020004" pitchFamily="49" charset="0"/>
+              </a:rPr>
+              <a:t>isFinished</a:t>
+            </a:r>
+            <a:r>
+              <a:rPr lang="en-US" sz="2000" dirty="0">
+                <a:solidFill>
+                  <a:srgbClr val="000000"/>
+                </a:solidFill>
+                <a:highlight>
+                  <a:srgbClr val="FFFFFF"/>
+                </a:highlight>
+                <a:latin typeface="Cascadia Mono" panose="020B0609020000020004" pitchFamily="49" charset="0"/>
+              </a:rPr>
+              <a:t>(</a:t>
+            </a:r>
+            <a:r>
+              <a:rPr lang="en-US" sz="2000" dirty="0">
+                <a:solidFill>
+                  <a:srgbClr val="0000FF"/>
+                </a:solidFill>
+                <a:highlight>
+                  <a:srgbClr val="FFFFFF"/>
+                </a:highlight>
+                <a:latin typeface="Cascadia Mono" panose="020B0609020000020004" pitchFamily="49" charset="0"/>
+              </a:rPr>
+              <a:t>void</a:t>
+            </a:r>
+            <a:r>
+              <a:rPr lang="en-US" sz="2000" dirty="0">
+                <a:solidFill>
+                  <a:srgbClr val="000000"/>
+                </a:solidFill>
+                <a:highlight>
+                  <a:srgbClr val="FFFFFF"/>
+                </a:highlight>
+                <a:latin typeface="Cascadia Mono" panose="020B0609020000020004" pitchFamily="49" charset="0"/>
+              </a:rPr>
+              <a:t>);</a:t>
+            </a:r>
+          </a:p>
+          <a:p>
+            <a:pPr lvl="3"/>
+            <a:r>
+              <a:rPr lang="en-US" sz="2000" dirty="0">
+                <a:solidFill>
+                  <a:srgbClr val="0000FF"/>
+                </a:solidFill>
+                <a:highlight>
+                  <a:srgbClr val="FFFFFF"/>
+                </a:highlight>
+                <a:latin typeface="Cascadia Mono" panose="020B0609020000020004" pitchFamily="49" charset="0"/>
+              </a:rPr>
+              <a:t>void</a:t>
+            </a:r>
+            <a:r>
+              <a:rPr lang="en-US" sz="2000" dirty="0">
+                <a:solidFill>
+                  <a:srgbClr val="000000"/>
+                </a:solidFill>
+                <a:highlight>
+                  <a:srgbClr val="FFFFFF"/>
+                </a:highlight>
+                <a:latin typeface="Cascadia Mono" panose="020B0609020000020004" pitchFamily="49" charset="0"/>
+              </a:rPr>
+              <a:t> </a:t>
+            </a:r>
+            <a:r>
+              <a:rPr lang="en-US" sz="2000" dirty="0" err="1">
+                <a:solidFill>
+                  <a:srgbClr val="000000"/>
+                </a:solidFill>
+                <a:highlight>
+                  <a:srgbClr val="FFFFFF"/>
+                </a:highlight>
+                <a:latin typeface="Cascadia Mono" panose="020B0609020000020004" pitchFamily="49" charset="0"/>
+              </a:rPr>
+              <a:t>OnFinished</a:t>
+            </a:r>
+            <a:r>
+              <a:rPr lang="en-US" sz="2000" dirty="0">
+                <a:solidFill>
+                  <a:srgbClr val="000000"/>
+                </a:solidFill>
+                <a:highlight>
+                  <a:srgbClr val="FFFFFF"/>
+                </a:highlight>
+                <a:latin typeface="Cascadia Mono" panose="020B0609020000020004" pitchFamily="49" charset="0"/>
+              </a:rPr>
+              <a:t>(</a:t>
+            </a:r>
+            <a:r>
+              <a:rPr lang="en-US" sz="2000" dirty="0">
+                <a:solidFill>
+                  <a:srgbClr val="0000FF"/>
+                </a:solidFill>
+                <a:highlight>
+                  <a:srgbClr val="FFFFFF"/>
+                </a:highlight>
+                <a:latin typeface="Cascadia Mono" panose="020B0609020000020004" pitchFamily="49" charset="0"/>
+              </a:rPr>
+              <a:t>void</a:t>
+            </a:r>
+            <a:r>
+              <a:rPr lang="en-US" sz="2000" dirty="0">
+                <a:solidFill>
+                  <a:srgbClr val="000000"/>
+                </a:solidFill>
+                <a:highlight>
+                  <a:srgbClr val="FFFFFF"/>
+                </a:highlight>
+                <a:latin typeface="Cascadia Mono" panose="020B0609020000020004" pitchFamily="49" charset="0"/>
+              </a:rPr>
+              <a:t>);</a:t>
+            </a:r>
+          </a:p>
+        </p:txBody>
+      </p:sp>
+    </p:spTree>
+    <p:extLst>
+      <p:ext uri="{BB962C8B-B14F-4D97-AF65-F5344CB8AC3E}">
+        <p14:creationId xmlns:p14="http://schemas.microsoft.com/office/powerpoint/2010/main" val="508373276"/>
+      </p:ext>
+    </p:extLst>
+  </p:cSld>
+  <p:clrMapOvr>
+    <a:masterClrMapping/>
+  </p:clrMapOvr>
+</p:sld>
+</file>
+
+<file path=ppt/slides/slide26.xml><?xml version="1.0" encoding="utf-8"?>
+<p:sld xmlns:a="http://schemas.openxmlformats.org/drawingml/2006/main" xmlns:r="http://schemas.openxmlformats.org/officeDocument/2006/relationships" xmlns:p="http://schemas.openxmlformats.org/presentationml/2006/main">
+  <p:cSld>
+    <p:spTree>
+      <p:nvGrpSpPr>
+        <p:cNvPr id="1" name=""/>
+        <p:cNvGrpSpPr/>
+        <p:nvPr/>
+      </p:nvGrpSpPr>
+      <p:grpSpPr>
+        <a:xfrm>
+          <a:off x="0" y="0"/>
+          <a:ext cx="0" cy="0"/>
+          <a:chOff x="0" y="0"/>
+          <a:chExt cx="0" cy="0"/>
+        </a:xfrm>
+      </p:grpSpPr>
+      <p:sp>
+        <p:nvSpPr>
+          <p:cNvPr id="3" name="Content Placeholder 2">
+            <a:extLst>
+              <a:ext uri="{FF2B5EF4-FFF2-40B4-BE49-F238E27FC236}">
+                <a16:creationId xmlns:a16="http://schemas.microsoft.com/office/drawing/2014/main" id="{E63D159C-4821-CC59-5719-7CA99EA5BCC2}"/>
+              </a:ext>
+            </a:extLst>
+          </p:cNvPr>
+          <p:cNvSpPr>
+            <a:spLocks noGrp="1"/>
+          </p:cNvSpPr>
+          <p:nvPr>
+            <p:ph idx="1"/>
+          </p:nvPr>
+        </p:nvSpPr>
+        <p:spPr>
+          <a:xfrm>
+            <a:off x="346587" y="528432"/>
+            <a:ext cx="10515600" cy="5801135"/>
+          </a:xfrm>
+        </p:spPr>
+        <p:txBody>
+          <a:bodyPr/>
+          <a:lstStyle/>
+          <a:p>
+            <a:pPr lvl="1"/>
+            <a:r>
+              <a:rPr lang="en-US" sz="2600" dirty="0">
+                <a:solidFill>
+                  <a:srgbClr val="0000FF"/>
+                </a:solidFill>
+                <a:highlight>
+                  <a:srgbClr val="FFFFFF"/>
+                </a:highlight>
+                <a:latin typeface="Cascadia Mono" panose="020B0609020000020004" pitchFamily="49" charset="0"/>
+              </a:rPr>
+              <a:t>void</a:t>
+            </a:r>
+            <a:r>
+              <a:rPr lang="en-US" sz="2600" dirty="0">
+                <a:solidFill>
+                  <a:srgbClr val="000000"/>
+                </a:solidFill>
+                <a:highlight>
+                  <a:srgbClr val="FFFFFF"/>
+                </a:highlight>
+                <a:latin typeface="Cascadia Mono" panose="020B0609020000020004" pitchFamily="49" charset="0"/>
+              </a:rPr>
+              <a:t> </a:t>
+            </a:r>
+            <a:r>
+              <a:rPr lang="en-US" sz="2600" dirty="0" err="1">
+                <a:solidFill>
+                  <a:srgbClr val="000000"/>
+                </a:solidFill>
+                <a:highlight>
+                  <a:srgbClr val="FFFFFF"/>
+                </a:highlight>
+                <a:latin typeface="Cascadia Mono" panose="020B0609020000020004" pitchFamily="49" charset="0"/>
+              </a:rPr>
+              <a:t>OnStart</a:t>
+            </a:r>
+            <a:r>
+              <a:rPr lang="en-US" sz="2600" dirty="0">
+                <a:solidFill>
+                  <a:srgbClr val="000000"/>
+                </a:solidFill>
+                <a:highlight>
+                  <a:srgbClr val="FFFFFF"/>
+                </a:highlight>
+                <a:latin typeface="Cascadia Mono" panose="020B0609020000020004" pitchFamily="49" charset="0"/>
+              </a:rPr>
+              <a:t>(</a:t>
+            </a:r>
+            <a:r>
+              <a:rPr lang="en-US" sz="2600" dirty="0">
+                <a:solidFill>
+                  <a:srgbClr val="0000FF"/>
+                </a:solidFill>
+                <a:highlight>
+                  <a:srgbClr val="FFFFFF"/>
+                </a:highlight>
+                <a:latin typeface="Cascadia Mono" panose="020B0609020000020004" pitchFamily="49" charset="0"/>
+              </a:rPr>
+              <a:t>void</a:t>
+            </a:r>
+            <a:r>
+              <a:rPr lang="en-US" sz="2600" dirty="0">
+                <a:solidFill>
+                  <a:srgbClr val="000000"/>
+                </a:solidFill>
+                <a:highlight>
+                  <a:srgbClr val="FFFFFF"/>
+                </a:highlight>
+                <a:latin typeface="Cascadia Mono" panose="020B0609020000020004" pitchFamily="49" charset="0"/>
+              </a:rPr>
+              <a:t>);</a:t>
+            </a:r>
+          </a:p>
+          <a:p>
+            <a:pPr lvl="2"/>
+            <a:r>
+              <a:rPr lang="en-US" sz="2200" dirty="0">
+                <a:solidFill>
+                  <a:srgbClr val="000000"/>
+                </a:solidFill>
+                <a:highlight>
+                  <a:srgbClr val="FFFFFF"/>
+                </a:highlight>
+                <a:latin typeface="Cascadia Mono" panose="020B0609020000020004" pitchFamily="49" charset="0"/>
+              </a:rPr>
+              <a:t>Optional, called when the command is created.</a:t>
+            </a:r>
+          </a:p>
+          <a:p>
+            <a:pPr lvl="2"/>
+            <a:r>
+              <a:rPr lang="en-US" sz="2200" dirty="0">
+                <a:solidFill>
+                  <a:srgbClr val="000000"/>
+                </a:solidFill>
+                <a:highlight>
+                  <a:srgbClr val="FFFFFF"/>
+                </a:highlight>
+                <a:latin typeface="Cascadia Mono" panose="020B0609020000020004" pitchFamily="49" charset="0"/>
+              </a:rPr>
+              <a:t>Could also be in the constructor</a:t>
+            </a:r>
+          </a:p>
+          <a:p>
+            <a:pPr lvl="1"/>
+            <a:r>
+              <a:rPr lang="en-CA" sz="2600" dirty="0">
+                <a:solidFill>
+                  <a:srgbClr val="0000FF"/>
+                </a:solidFill>
+                <a:highlight>
+                  <a:srgbClr val="FFFFFF"/>
+                </a:highlight>
+                <a:latin typeface="Cascadia Mono" panose="020B0609020000020004" pitchFamily="49" charset="0"/>
+              </a:rPr>
+              <a:t>void</a:t>
+            </a:r>
+            <a:r>
+              <a:rPr lang="en-CA" sz="2600" dirty="0">
+                <a:solidFill>
+                  <a:srgbClr val="000000"/>
+                </a:solidFill>
+                <a:highlight>
+                  <a:srgbClr val="FFFFFF"/>
+                </a:highlight>
+                <a:latin typeface="Cascadia Mono" panose="020B0609020000020004" pitchFamily="49" charset="0"/>
+              </a:rPr>
+              <a:t> Update(</a:t>
+            </a:r>
+            <a:r>
+              <a:rPr lang="en-CA" sz="2600" dirty="0">
+                <a:solidFill>
+                  <a:srgbClr val="0000FF"/>
+                </a:solidFill>
+                <a:highlight>
+                  <a:srgbClr val="FFFFFF"/>
+                </a:highlight>
+                <a:latin typeface="Cascadia Mono" panose="020B0609020000020004" pitchFamily="49" charset="0"/>
+              </a:rPr>
+              <a:t>double</a:t>
+            </a:r>
+            <a:r>
+              <a:rPr lang="en-CA" sz="2600" dirty="0">
+                <a:solidFill>
+                  <a:srgbClr val="000000"/>
+                </a:solidFill>
+                <a:highlight>
+                  <a:srgbClr val="FFFFFF"/>
+                </a:highlight>
+                <a:latin typeface="Cascadia Mono" panose="020B0609020000020004" pitchFamily="49" charset="0"/>
+              </a:rPr>
+              <a:t> </a:t>
+            </a:r>
+            <a:r>
+              <a:rPr lang="en-CA" sz="2600" dirty="0" err="1">
+                <a:solidFill>
+                  <a:srgbClr val="808080"/>
+                </a:solidFill>
+                <a:highlight>
+                  <a:srgbClr val="FFFFFF"/>
+                </a:highlight>
+                <a:latin typeface="Cascadia Mono" panose="020B0609020000020004" pitchFamily="49" charset="0"/>
+              </a:rPr>
+              <a:t>deltaTime</a:t>
+            </a:r>
+            <a:r>
+              <a:rPr lang="en-CA" sz="2600" dirty="0">
+                <a:solidFill>
+                  <a:srgbClr val="000000"/>
+                </a:solidFill>
+                <a:highlight>
+                  <a:srgbClr val="FFFFFF"/>
+                </a:highlight>
+                <a:latin typeface="Cascadia Mono" panose="020B0609020000020004" pitchFamily="49" charset="0"/>
+              </a:rPr>
+              <a:t>);</a:t>
+            </a:r>
+          </a:p>
+          <a:p>
+            <a:pPr lvl="2"/>
+            <a:r>
+              <a:rPr lang="en-CA" sz="2200" dirty="0">
+                <a:solidFill>
+                  <a:srgbClr val="000000"/>
+                </a:solidFill>
+                <a:highlight>
+                  <a:srgbClr val="FFFFFF"/>
+                </a:highlight>
+                <a:latin typeface="Cascadia Mono" panose="020B0609020000020004" pitchFamily="49" charset="0"/>
+              </a:rPr>
+              <a:t>Called every frame/tick until “</a:t>
+            </a:r>
+            <a:r>
+              <a:rPr lang="en-CA" sz="2200" dirty="0" err="1">
+                <a:solidFill>
+                  <a:srgbClr val="000000"/>
+                </a:solidFill>
+                <a:highlight>
+                  <a:srgbClr val="FFFFFF"/>
+                </a:highlight>
+                <a:latin typeface="Cascadia Mono" panose="020B0609020000020004" pitchFamily="49" charset="0"/>
+              </a:rPr>
+              <a:t>isFinished</a:t>
+            </a:r>
+            <a:r>
+              <a:rPr lang="en-CA" sz="2200" dirty="0">
+                <a:solidFill>
+                  <a:srgbClr val="000000"/>
+                </a:solidFill>
+                <a:highlight>
+                  <a:srgbClr val="FFFFFF"/>
+                </a:highlight>
+                <a:latin typeface="Cascadia Mono" panose="020B0609020000020004" pitchFamily="49" charset="0"/>
+              </a:rPr>
+              <a:t>” returns true</a:t>
+            </a:r>
+          </a:p>
+          <a:p>
+            <a:pPr lvl="2"/>
+            <a:r>
+              <a:rPr lang="en-CA" sz="2200" dirty="0">
+                <a:solidFill>
+                  <a:srgbClr val="000000"/>
+                </a:solidFill>
+                <a:highlight>
+                  <a:srgbClr val="FFFFFF"/>
+                </a:highlight>
+                <a:latin typeface="Cascadia Mono" panose="020B0609020000020004" pitchFamily="49" charset="0"/>
+              </a:rPr>
+              <a:t>The FIRST Robotics also has this return a bool</a:t>
+            </a:r>
+          </a:p>
+          <a:p>
+            <a:pPr lvl="2"/>
+            <a:r>
+              <a:rPr lang="en-CA" sz="2200" dirty="0">
+                <a:solidFill>
+                  <a:srgbClr val="000000"/>
+                </a:solidFill>
+                <a:highlight>
+                  <a:srgbClr val="FFFFFF"/>
+                </a:highlight>
+                <a:latin typeface="Cascadia Mono" panose="020B0609020000020004" pitchFamily="49" charset="0"/>
+              </a:rPr>
+              <a:t>Returns “false” when it’s done.</a:t>
+            </a:r>
+          </a:p>
+          <a:p>
+            <a:pPr lvl="1"/>
+            <a:r>
+              <a:rPr lang="en-US" sz="2600" dirty="0">
+                <a:solidFill>
+                  <a:srgbClr val="0000FF"/>
+                </a:solidFill>
+                <a:highlight>
+                  <a:srgbClr val="FFFFFF"/>
+                </a:highlight>
+                <a:latin typeface="Cascadia Mono" panose="020B0609020000020004" pitchFamily="49" charset="0"/>
+              </a:rPr>
+              <a:t>bool</a:t>
+            </a:r>
+            <a:r>
+              <a:rPr lang="en-US" sz="2600" dirty="0">
+                <a:solidFill>
+                  <a:srgbClr val="000000"/>
+                </a:solidFill>
+                <a:highlight>
+                  <a:srgbClr val="FFFFFF"/>
+                </a:highlight>
+                <a:latin typeface="Cascadia Mono" panose="020B0609020000020004" pitchFamily="49" charset="0"/>
+              </a:rPr>
+              <a:t> </a:t>
+            </a:r>
+            <a:r>
+              <a:rPr lang="en-US" sz="2600" dirty="0" err="1">
+                <a:solidFill>
+                  <a:srgbClr val="000000"/>
+                </a:solidFill>
+                <a:highlight>
+                  <a:srgbClr val="FFFFFF"/>
+                </a:highlight>
+                <a:latin typeface="Cascadia Mono" panose="020B0609020000020004" pitchFamily="49" charset="0"/>
+              </a:rPr>
+              <a:t>isFinished</a:t>
+            </a:r>
+            <a:r>
+              <a:rPr lang="en-US" sz="2600" dirty="0">
+                <a:solidFill>
+                  <a:srgbClr val="000000"/>
+                </a:solidFill>
+                <a:highlight>
+                  <a:srgbClr val="FFFFFF"/>
+                </a:highlight>
+                <a:latin typeface="Cascadia Mono" panose="020B0609020000020004" pitchFamily="49" charset="0"/>
+              </a:rPr>
+              <a:t>(</a:t>
+            </a:r>
+            <a:r>
+              <a:rPr lang="en-US" sz="2600" dirty="0">
+                <a:solidFill>
+                  <a:srgbClr val="0000FF"/>
+                </a:solidFill>
+                <a:highlight>
+                  <a:srgbClr val="FFFFFF"/>
+                </a:highlight>
+                <a:latin typeface="Cascadia Mono" panose="020B0609020000020004" pitchFamily="49" charset="0"/>
+              </a:rPr>
+              <a:t>void</a:t>
+            </a:r>
+            <a:r>
+              <a:rPr lang="en-US" sz="2600" dirty="0">
+                <a:solidFill>
+                  <a:srgbClr val="000000"/>
+                </a:solidFill>
+                <a:highlight>
+                  <a:srgbClr val="FFFFFF"/>
+                </a:highlight>
+                <a:latin typeface="Cascadia Mono" panose="020B0609020000020004" pitchFamily="49" charset="0"/>
+              </a:rPr>
+              <a:t>);</a:t>
+            </a:r>
+          </a:p>
+          <a:p>
+            <a:pPr lvl="2"/>
+            <a:r>
+              <a:rPr lang="en-US" sz="2200" dirty="0">
+                <a:solidFill>
+                  <a:srgbClr val="000000"/>
+                </a:solidFill>
+                <a:highlight>
+                  <a:srgbClr val="FFFFFF"/>
+                </a:highlight>
+                <a:latin typeface="Cascadia Mono" panose="020B0609020000020004" pitchFamily="49" charset="0"/>
+              </a:rPr>
+              <a:t>Returns true when commands is “done” (whatever that means)</a:t>
+            </a:r>
+          </a:p>
+          <a:p>
+            <a:pPr lvl="1"/>
+            <a:r>
+              <a:rPr lang="en-US" sz="2600" dirty="0">
+                <a:solidFill>
+                  <a:srgbClr val="0000FF"/>
+                </a:solidFill>
+                <a:highlight>
+                  <a:srgbClr val="FFFFFF"/>
+                </a:highlight>
+                <a:latin typeface="Cascadia Mono" panose="020B0609020000020004" pitchFamily="49" charset="0"/>
+              </a:rPr>
+              <a:t>void</a:t>
+            </a:r>
+            <a:r>
+              <a:rPr lang="en-US" sz="2600" dirty="0">
+                <a:solidFill>
+                  <a:srgbClr val="000000"/>
+                </a:solidFill>
+                <a:highlight>
+                  <a:srgbClr val="FFFFFF"/>
+                </a:highlight>
+                <a:latin typeface="Cascadia Mono" panose="020B0609020000020004" pitchFamily="49" charset="0"/>
+              </a:rPr>
+              <a:t> </a:t>
+            </a:r>
+            <a:r>
+              <a:rPr lang="en-US" sz="2600" dirty="0" err="1">
+                <a:solidFill>
+                  <a:srgbClr val="000000"/>
+                </a:solidFill>
+                <a:highlight>
+                  <a:srgbClr val="FFFFFF"/>
+                </a:highlight>
+                <a:latin typeface="Cascadia Mono" panose="020B0609020000020004" pitchFamily="49" charset="0"/>
+              </a:rPr>
+              <a:t>OnFinished</a:t>
+            </a:r>
+            <a:r>
+              <a:rPr lang="en-US" sz="2600" dirty="0">
+                <a:solidFill>
+                  <a:srgbClr val="000000"/>
+                </a:solidFill>
+                <a:highlight>
+                  <a:srgbClr val="FFFFFF"/>
+                </a:highlight>
+                <a:latin typeface="Cascadia Mono" panose="020B0609020000020004" pitchFamily="49" charset="0"/>
+              </a:rPr>
+              <a:t>(</a:t>
+            </a:r>
+            <a:r>
+              <a:rPr lang="en-US" sz="2600" dirty="0">
+                <a:solidFill>
+                  <a:srgbClr val="0000FF"/>
+                </a:solidFill>
+                <a:highlight>
+                  <a:srgbClr val="FFFFFF"/>
+                </a:highlight>
+                <a:latin typeface="Cascadia Mono" panose="020B0609020000020004" pitchFamily="49" charset="0"/>
+              </a:rPr>
+              <a:t>void</a:t>
+            </a:r>
+            <a:r>
+              <a:rPr lang="en-US" sz="2600" dirty="0">
+                <a:solidFill>
+                  <a:srgbClr val="000000"/>
+                </a:solidFill>
+                <a:highlight>
+                  <a:srgbClr val="FFFFFF"/>
+                </a:highlight>
+                <a:latin typeface="Cascadia Mono" panose="020B0609020000020004" pitchFamily="49" charset="0"/>
+              </a:rPr>
+              <a:t>);</a:t>
+            </a:r>
+          </a:p>
+          <a:p>
+            <a:pPr lvl="2"/>
+            <a:r>
+              <a:rPr lang="en-US" sz="2200" dirty="0">
+                <a:solidFill>
+                  <a:srgbClr val="000000"/>
+                </a:solidFill>
+                <a:highlight>
+                  <a:srgbClr val="FFFFFF"/>
+                </a:highlight>
+                <a:latin typeface="Cascadia Mono" panose="020B0609020000020004" pitchFamily="49" charset="0"/>
+              </a:rPr>
+              <a:t>Optional stuff that needs to happen after the command is finished </a:t>
+            </a:r>
+          </a:p>
+        </p:txBody>
+      </p:sp>
+    </p:spTree>
+    <p:extLst>
+      <p:ext uri="{BB962C8B-B14F-4D97-AF65-F5344CB8AC3E}">
+        <p14:creationId xmlns:p14="http://schemas.microsoft.com/office/powerpoint/2010/main" val="1612070899"/>
+      </p:ext>
+    </p:extLst>
+  </p:cSld>
+  <p:clrMapOvr>
+    <a:masterClrMapping/>
+  </p:clrMapOvr>
+</p:sld>
+</file>
+
 <file path=ppt/slides/slide3.xml><?xml version="1.0" encoding="utf-8"?>
 <p:sld xmlns:a="http://schemas.openxmlformats.org/drawingml/2006/main" xmlns:r="http://schemas.openxmlformats.org/officeDocument/2006/relationships" xmlns:p="http://schemas.openxmlformats.org/presentationml/2006/main">
   <p:cSld>

</xml_diff>